<commit_message>
New files and implemented resampling methods
</commit_message>
<xml_diff>
--- a/docs/progress_report.pptx
+++ b/docs/progress_report.pptx
@@ -5,10 +5,22 @@
     <p:sldMasterId id="2147483648" r:id="rId1"/>
   </p:sldMasterIdLst>
   <p:sldIdLst>
-    <p:sldId id="259" r:id="rId2"/>
-    <p:sldId id="256" r:id="rId3"/>
-    <p:sldId id="257" r:id="rId4"/>
-    <p:sldId id="258" r:id="rId5"/>
+    <p:sldId id="265" r:id="rId2"/>
+    <p:sldId id="266" r:id="rId3"/>
+    <p:sldId id="267" r:id="rId4"/>
+    <p:sldId id="268" r:id="rId5"/>
+    <p:sldId id="269" r:id="rId6"/>
+    <p:sldId id="270" r:id="rId7"/>
+    <p:sldId id="259" r:id="rId8"/>
+    <p:sldId id="258" r:id="rId9"/>
+    <p:sldId id="260" r:id="rId10"/>
+    <p:sldId id="264" r:id="rId11"/>
+    <p:sldId id="271" r:id="rId12"/>
+    <p:sldId id="273" r:id="rId13"/>
+    <p:sldId id="272" r:id="rId14"/>
+    <p:sldId id="263" r:id="rId15"/>
+    <p:sldId id="261" r:id="rId16"/>
+    <p:sldId id="262" r:id="rId17"/>
   </p:sldIdLst>
   <p:sldSz cx="12192000" cy="6858000"/>
   <p:notesSz cx="6858000" cy="9144000"/>
@@ -107,6 +119,11 @@
       </a:defRPr>
     </a:lvl9pPr>
   </p:defaultTextStyle>
+  <p:extLst>
+    <p:ext uri="{EFAFB233-063F-42B5-8137-9DF3F51BA10A}">
+      <p15:sldGuideLst xmlns:p15="http://schemas.microsoft.com/office/powerpoint/2012/main"/>
+    </p:ext>
+  </p:extLst>
 </p:presentation>
 </file>
 
@@ -257,7 +274,7 @@
           <a:p>
             <a:fld id="{C985B2CD-F43A-460A-B9AE-E70946351B0A}" type="datetimeFigureOut">
               <a:rPr lang="en-US" smtClean="0"/>
-              <a:t>9/21/2020</a:t>
+              <a:t>9/29/2020</a:t>
             </a:fld>
             <a:endParaRPr lang="en-US"/>
           </a:p>
@@ -455,7 +472,7 @@
           <a:p>
             <a:fld id="{C985B2CD-F43A-460A-B9AE-E70946351B0A}" type="datetimeFigureOut">
               <a:rPr lang="en-US" smtClean="0"/>
-              <a:t>9/21/2020</a:t>
+              <a:t>9/29/2020</a:t>
             </a:fld>
             <a:endParaRPr lang="en-US"/>
           </a:p>
@@ -663,7 +680,7 @@
           <a:p>
             <a:fld id="{C985B2CD-F43A-460A-B9AE-E70946351B0A}" type="datetimeFigureOut">
               <a:rPr lang="en-US" smtClean="0"/>
-              <a:t>9/21/2020</a:t>
+              <a:t>9/29/2020</a:t>
             </a:fld>
             <a:endParaRPr lang="en-US"/>
           </a:p>
@@ -861,7 +878,7 @@
           <a:p>
             <a:fld id="{C985B2CD-F43A-460A-B9AE-E70946351B0A}" type="datetimeFigureOut">
               <a:rPr lang="en-US" smtClean="0"/>
-              <a:t>9/21/2020</a:t>
+              <a:t>9/29/2020</a:t>
             </a:fld>
             <a:endParaRPr lang="en-US"/>
           </a:p>
@@ -1136,7 +1153,7 @@
           <a:p>
             <a:fld id="{C985B2CD-F43A-460A-B9AE-E70946351B0A}" type="datetimeFigureOut">
               <a:rPr lang="en-US" smtClean="0"/>
-              <a:t>9/21/2020</a:t>
+              <a:t>9/29/2020</a:t>
             </a:fld>
             <a:endParaRPr lang="en-US"/>
           </a:p>
@@ -1401,7 +1418,7 @@
           <a:p>
             <a:fld id="{C985B2CD-F43A-460A-B9AE-E70946351B0A}" type="datetimeFigureOut">
               <a:rPr lang="en-US" smtClean="0"/>
-              <a:t>9/21/2020</a:t>
+              <a:t>9/29/2020</a:t>
             </a:fld>
             <a:endParaRPr lang="en-US"/>
           </a:p>
@@ -1813,7 +1830,7 @@
           <a:p>
             <a:fld id="{C985B2CD-F43A-460A-B9AE-E70946351B0A}" type="datetimeFigureOut">
               <a:rPr lang="en-US" smtClean="0"/>
-              <a:t>9/21/2020</a:t>
+              <a:t>9/29/2020</a:t>
             </a:fld>
             <a:endParaRPr lang="en-US"/>
           </a:p>
@@ -1954,7 +1971,7 @@
           <a:p>
             <a:fld id="{C985B2CD-F43A-460A-B9AE-E70946351B0A}" type="datetimeFigureOut">
               <a:rPr lang="en-US" smtClean="0"/>
-              <a:t>9/21/2020</a:t>
+              <a:t>9/29/2020</a:t>
             </a:fld>
             <a:endParaRPr lang="en-US"/>
           </a:p>
@@ -2067,7 +2084,7 @@
           <a:p>
             <a:fld id="{C985B2CD-F43A-460A-B9AE-E70946351B0A}" type="datetimeFigureOut">
               <a:rPr lang="en-US" smtClean="0"/>
-              <a:t>9/21/2020</a:t>
+              <a:t>9/29/2020</a:t>
             </a:fld>
             <a:endParaRPr lang="en-US"/>
           </a:p>
@@ -2378,7 +2395,7 @@
           <a:p>
             <a:fld id="{C985B2CD-F43A-460A-B9AE-E70946351B0A}" type="datetimeFigureOut">
               <a:rPr lang="en-US" smtClean="0"/>
-              <a:t>9/21/2020</a:t>
+              <a:t>9/29/2020</a:t>
             </a:fld>
             <a:endParaRPr lang="en-US"/>
           </a:p>
@@ -2666,7 +2683,7 @@
           <a:p>
             <a:fld id="{C985B2CD-F43A-460A-B9AE-E70946351B0A}" type="datetimeFigureOut">
               <a:rPr lang="en-US" smtClean="0"/>
-              <a:t>9/21/2020</a:t>
+              <a:t>9/29/2020</a:t>
             </a:fld>
             <a:endParaRPr lang="en-US"/>
           </a:p>
@@ -2907,7 +2924,7 @@
           <a:p>
             <a:fld id="{C985B2CD-F43A-460A-B9AE-E70946351B0A}" type="datetimeFigureOut">
               <a:rPr lang="en-US" smtClean="0"/>
-              <a:t>9/21/2020</a:t>
+              <a:t>9/29/2020</a:t>
             </a:fld>
             <a:endParaRPr lang="en-US"/>
           </a:p>
@@ -3329,6 +3346,2006 @@
           <p:cNvPr id="2" name="Title 1">
             <a:extLst>
               <a:ext uri="{FF2B5EF4-FFF2-40B4-BE49-F238E27FC236}">
+                <a16:creationId xmlns:a16="http://schemas.microsoft.com/office/drawing/2014/main" id="{604E11DD-3504-4215-8077-82AD1425955C}"/>
+              </a:ext>
+            </a:extLst>
+          </p:cNvPr>
+          <p:cNvSpPr>
+            <a:spLocks noGrp="1"/>
+          </p:cNvSpPr>
+          <p:nvPr>
+            <p:ph type="ctrTitle"/>
+          </p:nvPr>
+        </p:nvSpPr>
+        <p:spPr/>
+        <p:txBody>
+          <a:bodyPr/>
+          <a:lstStyle/>
+          <a:p>
+            <a:r>
+              <a:rPr lang="en-US" dirty="0"/>
+              <a:t>Taxonomic aggregation using isometric log ratios</a:t>
+            </a:r>
+          </a:p>
+        </p:txBody>
+      </p:sp>
+      <p:sp>
+        <p:nvSpPr>
+          <p:cNvPr id="3" name="Subtitle 2">
+            <a:extLst>
+              <a:ext uri="{FF2B5EF4-FFF2-40B4-BE49-F238E27FC236}">
+                <a16:creationId xmlns:a16="http://schemas.microsoft.com/office/drawing/2014/main" id="{20035AB6-0E78-4C47-8669-481971065E0C}"/>
+              </a:ext>
+            </a:extLst>
+          </p:cNvPr>
+          <p:cNvSpPr>
+            <a:spLocks noGrp="1"/>
+          </p:cNvSpPr>
+          <p:nvPr>
+            <p:ph type="subTitle" idx="1"/>
+          </p:nvPr>
+        </p:nvSpPr>
+        <p:spPr/>
+        <p:txBody>
+          <a:bodyPr/>
+          <a:lstStyle/>
+          <a:p>
+            <a:r>
+              <a:rPr lang="en-US" dirty="0"/>
+              <a:t>Quang Nguyen </a:t>
+            </a:r>
+            <a:br>
+              <a:rPr lang="en-US" dirty="0"/>
+            </a:br>
+            <a:r>
+              <a:rPr lang="en-US" dirty="0"/>
+              <a:t>Work in Progress</a:t>
+            </a:r>
+          </a:p>
+        </p:txBody>
+      </p:sp>
+    </p:spTree>
+    <p:extLst>
+      <p:ext uri="{BB962C8B-B14F-4D97-AF65-F5344CB8AC3E}">
+        <p14:creationId xmlns:p14="http://schemas.microsoft.com/office/powerpoint/2010/main" val="821828524"/>
+      </p:ext>
+    </p:extLst>
+  </p:cSld>
+  <p:clrMapOvr>
+    <a:masterClrMapping/>
+  </p:clrMapOvr>
+</p:sld>
+</file>
+
+<file path=ppt/slides/slide10.xml><?xml version="1.0" encoding="utf-8"?>
+<p:sld xmlns:a="http://schemas.openxmlformats.org/drawingml/2006/main" xmlns:r="http://schemas.openxmlformats.org/officeDocument/2006/relationships" xmlns:p="http://schemas.openxmlformats.org/presentationml/2006/main">
+  <p:cSld>
+    <p:spTree>
+      <p:nvGrpSpPr>
+        <p:cNvPr id="1" name=""/>
+        <p:cNvGrpSpPr/>
+        <p:nvPr/>
+      </p:nvGrpSpPr>
+      <p:grpSpPr>
+        <a:xfrm>
+          <a:off x="0" y="0"/>
+          <a:ext cx="0" cy="0"/>
+          <a:chOff x="0" y="0"/>
+          <a:chExt cx="0" cy="0"/>
+        </a:xfrm>
+      </p:grpSpPr>
+      <p:pic>
+        <p:nvPicPr>
+          <p:cNvPr id="3" name="Picture 2" descr="Chart, line chart&#10;&#10;Description automatically generated">
+            <a:extLst>
+              <a:ext uri="{FF2B5EF4-FFF2-40B4-BE49-F238E27FC236}">
+                <a16:creationId xmlns:a16="http://schemas.microsoft.com/office/drawing/2014/main" id="{DB5067B4-3E5A-424B-90FC-370EE3E4B7E8}"/>
+              </a:ext>
+            </a:extLst>
+          </p:cNvPr>
+          <p:cNvPicPr>
+            <a:picLocks noChangeAspect="1"/>
+          </p:cNvPicPr>
+          <p:nvPr/>
+        </p:nvPicPr>
+        <p:blipFill>
+          <a:blip r:embed="rId2">
+            <a:extLst>
+              <a:ext uri="{28A0092B-C50C-407E-A947-70E740481C1C}">
+                <a14:useLocalDpi xmlns:a14="http://schemas.microsoft.com/office/drawing/2010/main" val="0"/>
+              </a:ext>
+            </a:extLst>
+          </a:blip>
+          <a:stretch>
+            <a:fillRect/>
+          </a:stretch>
+        </p:blipFill>
+        <p:spPr>
+          <a:xfrm>
+            <a:off x="341734" y="228593"/>
+            <a:ext cx="10972822" cy="6400813"/>
+          </a:xfrm>
+          <a:prstGeom prst="rect">
+            <a:avLst/>
+          </a:prstGeom>
+        </p:spPr>
+      </p:pic>
+    </p:spTree>
+    <p:extLst>
+      <p:ext uri="{BB962C8B-B14F-4D97-AF65-F5344CB8AC3E}">
+        <p14:creationId xmlns:p14="http://schemas.microsoft.com/office/powerpoint/2010/main" val="2318282007"/>
+      </p:ext>
+    </p:extLst>
+  </p:cSld>
+  <p:clrMapOvr>
+    <a:masterClrMapping/>
+  </p:clrMapOvr>
+</p:sld>
+</file>
+
+<file path=ppt/slides/slide11.xml><?xml version="1.0" encoding="utf-8"?>
+<p:sld xmlns:a="http://schemas.openxmlformats.org/drawingml/2006/main" xmlns:r="http://schemas.openxmlformats.org/officeDocument/2006/relationships" xmlns:p="http://schemas.openxmlformats.org/presentationml/2006/main">
+  <p:cSld>
+    <p:spTree>
+      <p:nvGrpSpPr>
+        <p:cNvPr id="1" name=""/>
+        <p:cNvGrpSpPr/>
+        <p:nvPr/>
+      </p:nvGrpSpPr>
+      <p:grpSpPr>
+        <a:xfrm>
+          <a:off x="0" y="0"/>
+          <a:ext cx="0" cy="0"/>
+          <a:chOff x="0" y="0"/>
+          <a:chExt cx="0" cy="0"/>
+        </a:xfrm>
+      </p:grpSpPr>
+      <p:sp>
+        <p:nvSpPr>
+          <p:cNvPr id="4" name="TextBox 3">
+            <a:extLst>
+              <a:ext uri="{FF2B5EF4-FFF2-40B4-BE49-F238E27FC236}">
+                <a16:creationId xmlns:a16="http://schemas.microsoft.com/office/drawing/2014/main" id="{CF2E4B08-A27B-441A-9BE9-971197714EED}"/>
+              </a:ext>
+            </a:extLst>
+          </p:cNvPr>
+          <p:cNvSpPr txBox="1"/>
+          <p:nvPr/>
+        </p:nvSpPr>
+        <p:spPr>
+          <a:xfrm>
+            <a:off x="72409" y="144412"/>
+            <a:ext cx="12359736" cy="553998"/>
+          </a:xfrm>
+          <a:prstGeom prst="rect">
+            <a:avLst/>
+          </a:prstGeom>
+          <a:noFill/>
+        </p:spPr>
+        <p:txBody>
+          <a:bodyPr wrap="square" rtlCol="0">
+            <a:spAutoFit/>
+          </a:bodyPr>
+          <a:lstStyle/>
+          <a:p>
+            <a:r>
+              <a:rPr lang="en-US" sz="3000" dirty="0"/>
+              <a:t>Hypothesis-testing at the single sample level</a:t>
+            </a:r>
+          </a:p>
+        </p:txBody>
+      </p:sp>
+      <p:pic>
+        <p:nvPicPr>
+          <p:cNvPr id="3" name="Picture 2" descr="Chart&#10;&#10;Description automatically generated">
+            <a:extLst>
+              <a:ext uri="{FF2B5EF4-FFF2-40B4-BE49-F238E27FC236}">
+                <a16:creationId xmlns:a16="http://schemas.microsoft.com/office/drawing/2014/main" id="{6FBB2C1B-53CF-4E16-B066-F983521F0E0A}"/>
+              </a:ext>
+            </a:extLst>
+          </p:cNvPr>
+          <p:cNvPicPr>
+            <a:picLocks noChangeAspect="1"/>
+          </p:cNvPicPr>
+          <p:nvPr/>
+        </p:nvPicPr>
+        <p:blipFill>
+          <a:blip r:embed="rId2">
+            <a:extLst>
+              <a:ext uri="{28A0092B-C50C-407E-A947-70E740481C1C}">
+                <a14:useLocalDpi xmlns:a14="http://schemas.microsoft.com/office/drawing/2010/main" val="0"/>
+              </a:ext>
+            </a:extLst>
+          </a:blip>
+          <a:stretch>
+            <a:fillRect/>
+          </a:stretch>
+        </p:blipFill>
+        <p:spPr>
+          <a:xfrm>
+            <a:off x="249381" y="609600"/>
+            <a:ext cx="6248400" cy="6248400"/>
+          </a:xfrm>
+          <a:prstGeom prst="rect">
+            <a:avLst/>
+          </a:prstGeom>
+        </p:spPr>
+      </p:pic>
+      <p:pic>
+        <p:nvPicPr>
+          <p:cNvPr id="9" name="Picture 8" descr="Graphical user interface, chart&#10;&#10;Description automatically generated">
+            <a:extLst>
+              <a:ext uri="{FF2B5EF4-FFF2-40B4-BE49-F238E27FC236}">
+                <a16:creationId xmlns:a16="http://schemas.microsoft.com/office/drawing/2014/main" id="{991AB92C-9B35-48DA-8737-1933C7CC3C86}"/>
+              </a:ext>
+            </a:extLst>
+          </p:cNvPr>
+          <p:cNvPicPr>
+            <a:picLocks noChangeAspect="1"/>
+          </p:cNvPicPr>
+          <p:nvPr/>
+        </p:nvPicPr>
+        <p:blipFill>
+          <a:blip r:embed="rId3">
+            <a:extLst>
+              <a:ext uri="{28A0092B-C50C-407E-A947-70E740481C1C}">
+                <a14:useLocalDpi xmlns:a14="http://schemas.microsoft.com/office/drawing/2010/main" val="0"/>
+              </a:ext>
+            </a:extLst>
+          </a:blip>
+          <a:stretch>
+            <a:fillRect/>
+          </a:stretch>
+        </p:blipFill>
+        <p:spPr>
+          <a:xfrm>
+            <a:off x="5454072" y="609600"/>
+            <a:ext cx="6248400" cy="6248400"/>
+          </a:xfrm>
+          <a:prstGeom prst="rect">
+            <a:avLst/>
+          </a:prstGeom>
+        </p:spPr>
+      </p:pic>
+    </p:spTree>
+    <p:extLst>
+      <p:ext uri="{BB962C8B-B14F-4D97-AF65-F5344CB8AC3E}">
+        <p14:creationId xmlns:p14="http://schemas.microsoft.com/office/powerpoint/2010/main" val="3748886881"/>
+      </p:ext>
+    </p:extLst>
+  </p:cSld>
+  <p:clrMapOvr>
+    <a:masterClrMapping/>
+  </p:clrMapOvr>
+</p:sld>
+</file>
+
+<file path=ppt/slides/slide12.xml><?xml version="1.0" encoding="utf-8"?>
+<p:sld xmlns:a="http://schemas.openxmlformats.org/drawingml/2006/main" xmlns:r="http://schemas.openxmlformats.org/officeDocument/2006/relationships" xmlns:p="http://schemas.openxmlformats.org/presentationml/2006/main">
+  <p:cSld>
+    <p:spTree>
+      <p:nvGrpSpPr>
+        <p:cNvPr id="1" name=""/>
+        <p:cNvGrpSpPr/>
+        <p:nvPr/>
+      </p:nvGrpSpPr>
+      <p:grpSpPr>
+        <a:xfrm>
+          <a:off x="0" y="0"/>
+          <a:ext cx="0" cy="0"/>
+          <a:chOff x="0" y="0"/>
+          <a:chExt cx="0" cy="0"/>
+        </a:xfrm>
+      </p:grpSpPr>
+      <p:sp>
+        <p:nvSpPr>
+          <p:cNvPr id="4" name="TextBox 3">
+            <a:extLst>
+              <a:ext uri="{FF2B5EF4-FFF2-40B4-BE49-F238E27FC236}">
+                <a16:creationId xmlns:a16="http://schemas.microsoft.com/office/drawing/2014/main" id="{CF2E4B08-A27B-441A-9BE9-971197714EED}"/>
+              </a:ext>
+            </a:extLst>
+          </p:cNvPr>
+          <p:cNvSpPr txBox="1"/>
+          <p:nvPr/>
+        </p:nvSpPr>
+        <p:spPr>
+          <a:xfrm>
+            <a:off x="72409" y="144412"/>
+            <a:ext cx="5153932" cy="1015663"/>
+          </a:xfrm>
+          <a:prstGeom prst="rect">
+            <a:avLst/>
+          </a:prstGeom>
+          <a:noFill/>
+        </p:spPr>
+        <p:txBody>
+          <a:bodyPr wrap="square" rtlCol="0">
+            <a:spAutoFit/>
+          </a:bodyPr>
+          <a:lstStyle/>
+          <a:p>
+            <a:r>
+              <a:rPr lang="en-US" sz="3000" dirty="0"/>
+              <a:t>Classification performance at the single sample level</a:t>
+            </a:r>
+          </a:p>
+        </p:txBody>
+      </p:sp>
+      <p:pic>
+        <p:nvPicPr>
+          <p:cNvPr id="5" name="Picture 4" descr="Chart, scatter chart&#10;&#10;Description automatically generated">
+            <a:extLst>
+              <a:ext uri="{FF2B5EF4-FFF2-40B4-BE49-F238E27FC236}">
+                <a16:creationId xmlns:a16="http://schemas.microsoft.com/office/drawing/2014/main" id="{46345D8C-91F0-467F-B740-A185D161751C}"/>
+              </a:ext>
+            </a:extLst>
+          </p:cNvPr>
+          <p:cNvPicPr>
+            <a:picLocks noChangeAspect="1"/>
+          </p:cNvPicPr>
+          <p:nvPr/>
+        </p:nvPicPr>
+        <p:blipFill>
+          <a:blip r:embed="rId2">
+            <a:extLst>
+              <a:ext uri="{28A0092B-C50C-407E-A947-70E740481C1C}">
+                <a14:useLocalDpi xmlns:a14="http://schemas.microsoft.com/office/drawing/2010/main" val="0"/>
+              </a:ext>
+            </a:extLst>
+          </a:blip>
+          <a:stretch>
+            <a:fillRect/>
+          </a:stretch>
+        </p:blipFill>
+        <p:spPr>
+          <a:xfrm>
+            <a:off x="5334000" y="0"/>
+            <a:ext cx="6858000" cy="6858000"/>
+          </a:xfrm>
+          <a:prstGeom prst="rect">
+            <a:avLst/>
+          </a:prstGeom>
+        </p:spPr>
+      </p:pic>
+      <p:sp>
+        <p:nvSpPr>
+          <p:cNvPr id="6" name="TextBox 5">
+            <a:extLst>
+              <a:ext uri="{FF2B5EF4-FFF2-40B4-BE49-F238E27FC236}">
+                <a16:creationId xmlns:a16="http://schemas.microsoft.com/office/drawing/2014/main" id="{DB98E60D-EC3F-4E3B-B3D2-564753DCDB01}"/>
+              </a:ext>
+            </a:extLst>
+          </p:cNvPr>
+          <p:cNvSpPr txBox="1"/>
+          <p:nvPr/>
+        </p:nvSpPr>
+        <p:spPr>
+          <a:xfrm>
+            <a:off x="184558" y="2228671"/>
+            <a:ext cx="4639112" cy="1200329"/>
+          </a:xfrm>
+          <a:prstGeom prst="rect">
+            <a:avLst/>
+          </a:prstGeom>
+          <a:noFill/>
+        </p:spPr>
+        <p:txBody>
+          <a:bodyPr wrap="square" rtlCol="0">
+            <a:spAutoFit/>
+          </a:bodyPr>
+          <a:lstStyle/>
+          <a:p>
+            <a:pPr marL="285750" indent="-285750">
+              <a:buFont typeface="Arial" panose="020B0604020202020204" pitchFamily="34" charset="0"/>
+              <a:buChar char="•"/>
+            </a:pPr>
+            <a:r>
+              <a:rPr lang="en-US" dirty="0"/>
+              <a:t>Quantifies the rank-ordering of samples based on enrichment scores </a:t>
+            </a:r>
+          </a:p>
+          <a:p>
+            <a:pPr marL="742950" lvl="1" indent="-285750">
+              <a:buFont typeface="Arial" panose="020B0604020202020204" pitchFamily="34" charset="0"/>
+              <a:buChar char="•"/>
+            </a:pPr>
+            <a:r>
+              <a:rPr lang="en-US" dirty="0"/>
+              <a:t>Similar to P(Y = 1|X) in a logistic regression to construct an ROC curve</a:t>
+            </a:r>
+          </a:p>
+        </p:txBody>
+      </p:sp>
+    </p:spTree>
+    <p:extLst>
+      <p:ext uri="{BB962C8B-B14F-4D97-AF65-F5344CB8AC3E}">
+        <p14:creationId xmlns:p14="http://schemas.microsoft.com/office/powerpoint/2010/main" val="554809015"/>
+      </p:ext>
+    </p:extLst>
+  </p:cSld>
+  <p:clrMapOvr>
+    <a:masterClrMapping/>
+  </p:clrMapOvr>
+</p:sld>
+</file>
+
+<file path=ppt/slides/slide13.xml><?xml version="1.0" encoding="utf-8"?>
+<p:sld xmlns:a="http://schemas.openxmlformats.org/drawingml/2006/main" xmlns:r="http://schemas.openxmlformats.org/officeDocument/2006/relationships" xmlns:p="http://schemas.openxmlformats.org/presentationml/2006/main">
+  <p:cSld>
+    <p:spTree>
+      <p:nvGrpSpPr>
+        <p:cNvPr id="1" name=""/>
+        <p:cNvGrpSpPr/>
+        <p:nvPr/>
+      </p:nvGrpSpPr>
+      <p:grpSpPr>
+        <a:xfrm>
+          <a:off x="0" y="0"/>
+          <a:ext cx="0" cy="0"/>
+          <a:chOff x="0" y="0"/>
+          <a:chExt cx="0" cy="0"/>
+        </a:xfrm>
+      </p:grpSpPr>
+      <p:sp>
+        <p:nvSpPr>
+          <p:cNvPr id="2" name="Title 1">
+            <a:extLst>
+              <a:ext uri="{FF2B5EF4-FFF2-40B4-BE49-F238E27FC236}">
+                <a16:creationId xmlns:a16="http://schemas.microsoft.com/office/drawing/2014/main" id="{192B7BD8-80B0-4B5C-A9D6-E0FE8ABA3BFA}"/>
+              </a:ext>
+            </a:extLst>
+          </p:cNvPr>
+          <p:cNvSpPr>
+            <a:spLocks noGrp="1"/>
+          </p:cNvSpPr>
+          <p:nvPr>
+            <p:ph type="title"/>
+          </p:nvPr>
+        </p:nvSpPr>
+        <p:spPr/>
+        <p:txBody>
+          <a:bodyPr/>
+          <a:lstStyle/>
+          <a:p>
+            <a:r>
+              <a:rPr lang="en-US" dirty="0"/>
+              <a:t>Next steps	</a:t>
+            </a:r>
+          </a:p>
+        </p:txBody>
+      </p:sp>
+      <p:sp>
+        <p:nvSpPr>
+          <p:cNvPr id="3" name="Content Placeholder 2">
+            <a:extLst>
+              <a:ext uri="{FF2B5EF4-FFF2-40B4-BE49-F238E27FC236}">
+                <a16:creationId xmlns:a16="http://schemas.microsoft.com/office/drawing/2014/main" id="{18CE26D2-F320-4403-A2AE-21FC58AF7EA8}"/>
+              </a:ext>
+            </a:extLst>
+          </p:cNvPr>
+          <p:cNvSpPr>
+            <a:spLocks noGrp="1"/>
+          </p:cNvSpPr>
+          <p:nvPr>
+            <p:ph idx="1"/>
+          </p:nvPr>
+        </p:nvSpPr>
+        <p:spPr/>
+        <p:txBody>
+          <a:bodyPr/>
+          <a:lstStyle/>
+          <a:p>
+            <a:r>
+              <a:rPr lang="en-US" dirty="0"/>
+              <a:t>Continue working with simulations for predictive power and differential abundance analysis</a:t>
+            </a:r>
+          </a:p>
+          <a:p>
+            <a:pPr lvl="1"/>
+            <a:r>
+              <a:rPr lang="en-US" dirty="0"/>
+              <a:t>More complex correlation structures and complex sparsity settings</a:t>
+            </a:r>
+          </a:p>
+          <a:p>
+            <a:r>
+              <a:rPr lang="en-US" dirty="0"/>
+              <a:t>Seeing if different zero-treatments would improve performance. </a:t>
+            </a:r>
+          </a:p>
+          <a:p>
+            <a:r>
+              <a:rPr lang="en-US" dirty="0"/>
+              <a:t>Figure out the best way to get the null distribution of the test statistic to improve power and type I error at the single sample level</a:t>
+            </a:r>
+          </a:p>
+        </p:txBody>
+      </p:sp>
+    </p:spTree>
+    <p:extLst>
+      <p:ext uri="{BB962C8B-B14F-4D97-AF65-F5344CB8AC3E}">
+        <p14:creationId xmlns:p14="http://schemas.microsoft.com/office/powerpoint/2010/main" val="666297524"/>
+      </p:ext>
+    </p:extLst>
+  </p:cSld>
+  <p:clrMapOvr>
+    <a:masterClrMapping/>
+  </p:clrMapOvr>
+</p:sld>
+</file>
+
+<file path=ppt/slides/slide14.xml><?xml version="1.0" encoding="utf-8"?>
+<p:sld xmlns:a="http://schemas.openxmlformats.org/drawingml/2006/main" xmlns:r="http://schemas.openxmlformats.org/officeDocument/2006/relationships" xmlns:p="http://schemas.openxmlformats.org/presentationml/2006/main">
+  <p:cSld>
+    <p:spTree>
+      <p:nvGrpSpPr>
+        <p:cNvPr id="1" name=""/>
+        <p:cNvGrpSpPr/>
+        <p:nvPr/>
+      </p:nvGrpSpPr>
+      <p:grpSpPr>
+        <a:xfrm>
+          <a:off x="0" y="0"/>
+          <a:ext cx="0" cy="0"/>
+          <a:chOff x="0" y="0"/>
+          <a:chExt cx="0" cy="0"/>
+        </a:xfrm>
+      </p:grpSpPr>
+      <p:sp>
+        <p:nvSpPr>
+          <p:cNvPr id="4" name="TextBox 3">
+            <a:extLst>
+              <a:ext uri="{FF2B5EF4-FFF2-40B4-BE49-F238E27FC236}">
+                <a16:creationId xmlns:a16="http://schemas.microsoft.com/office/drawing/2014/main" id="{CF2E4B08-A27B-441A-9BE9-971197714EED}"/>
+              </a:ext>
+            </a:extLst>
+          </p:cNvPr>
+          <p:cNvSpPr txBox="1"/>
+          <p:nvPr/>
+        </p:nvSpPr>
+        <p:spPr>
+          <a:xfrm>
+            <a:off x="366024" y="2921168"/>
+            <a:ext cx="4767943" cy="1107996"/>
+          </a:xfrm>
+          <a:prstGeom prst="rect">
+            <a:avLst/>
+          </a:prstGeom>
+          <a:noFill/>
+        </p:spPr>
+        <p:txBody>
+          <a:bodyPr wrap="square" rtlCol="0">
+            <a:spAutoFit/>
+          </a:bodyPr>
+          <a:lstStyle/>
+          <a:p>
+            <a:r>
+              <a:rPr lang="en-US" sz="2200" dirty="0"/>
+              <a:t>Comparing 1-sided and 2-sided tests between Wilcoxon rank sum test and test based on the CILR method</a:t>
+            </a:r>
+          </a:p>
+        </p:txBody>
+      </p:sp>
+      <p:pic>
+        <p:nvPicPr>
+          <p:cNvPr id="5" name="Picture 4" descr="Chart&#10;&#10;Description automatically generated">
+            <a:extLst>
+              <a:ext uri="{FF2B5EF4-FFF2-40B4-BE49-F238E27FC236}">
+                <a16:creationId xmlns:a16="http://schemas.microsoft.com/office/drawing/2014/main" id="{96F1EC57-4BFE-488B-8794-2873C1113DC4}"/>
+              </a:ext>
+            </a:extLst>
+          </p:cNvPr>
+          <p:cNvPicPr>
+            <a:picLocks noChangeAspect="1"/>
+          </p:cNvPicPr>
+          <p:nvPr/>
+        </p:nvPicPr>
+        <p:blipFill>
+          <a:blip r:embed="rId2">
+            <a:extLst>
+              <a:ext uri="{28A0092B-C50C-407E-A947-70E740481C1C}">
+                <a14:useLocalDpi xmlns:a14="http://schemas.microsoft.com/office/drawing/2010/main" val="0"/>
+              </a:ext>
+            </a:extLst>
+          </a:blip>
+          <a:stretch>
+            <a:fillRect/>
+          </a:stretch>
+        </p:blipFill>
+        <p:spPr>
+          <a:xfrm>
+            <a:off x="5334000" y="0"/>
+            <a:ext cx="6858000" cy="6858000"/>
+          </a:xfrm>
+          <a:prstGeom prst="rect">
+            <a:avLst/>
+          </a:prstGeom>
+        </p:spPr>
+      </p:pic>
+    </p:spTree>
+    <p:extLst>
+      <p:ext uri="{BB962C8B-B14F-4D97-AF65-F5344CB8AC3E}">
+        <p14:creationId xmlns:p14="http://schemas.microsoft.com/office/powerpoint/2010/main" val="273845290"/>
+      </p:ext>
+    </p:extLst>
+  </p:cSld>
+  <p:clrMapOvr>
+    <a:masterClrMapping/>
+  </p:clrMapOvr>
+</p:sld>
+</file>
+
+<file path=ppt/slides/slide15.xml><?xml version="1.0" encoding="utf-8"?>
+<p:sld xmlns:a="http://schemas.openxmlformats.org/drawingml/2006/main" xmlns:r="http://schemas.openxmlformats.org/officeDocument/2006/relationships" xmlns:p="http://schemas.openxmlformats.org/presentationml/2006/main">
+  <p:cSld>
+    <p:spTree>
+      <p:nvGrpSpPr>
+        <p:cNvPr id="1" name=""/>
+        <p:cNvGrpSpPr/>
+        <p:nvPr/>
+      </p:nvGrpSpPr>
+      <p:grpSpPr>
+        <a:xfrm>
+          <a:off x="0" y="0"/>
+          <a:ext cx="0" cy="0"/>
+          <a:chOff x="0" y="0"/>
+          <a:chExt cx="0" cy="0"/>
+        </a:xfrm>
+      </p:grpSpPr>
+      <p:sp>
+        <p:nvSpPr>
+          <p:cNvPr id="4" name="TextBox 3">
+            <a:extLst>
+              <a:ext uri="{FF2B5EF4-FFF2-40B4-BE49-F238E27FC236}">
+                <a16:creationId xmlns:a16="http://schemas.microsoft.com/office/drawing/2014/main" id="{CF2E4B08-A27B-441A-9BE9-971197714EED}"/>
+              </a:ext>
+            </a:extLst>
+          </p:cNvPr>
+          <p:cNvSpPr txBox="1"/>
+          <p:nvPr/>
+        </p:nvSpPr>
+        <p:spPr>
+          <a:xfrm>
+            <a:off x="329079" y="2875002"/>
+            <a:ext cx="4767943" cy="1107996"/>
+          </a:xfrm>
+          <a:prstGeom prst="rect">
+            <a:avLst/>
+          </a:prstGeom>
+          <a:noFill/>
+        </p:spPr>
+        <p:txBody>
+          <a:bodyPr wrap="square" rtlCol="0">
+            <a:spAutoFit/>
+          </a:bodyPr>
+          <a:lstStyle/>
+          <a:p>
+            <a:r>
+              <a:rPr lang="en-US" sz="2200" dirty="0"/>
+              <a:t>Comparing Power between 1-sided and 2-sided tests for the </a:t>
+            </a:r>
+            <a:r>
+              <a:rPr lang="en-US" sz="2200" dirty="0" err="1"/>
+              <a:t>cILR</a:t>
+            </a:r>
+            <a:r>
+              <a:rPr lang="en-US" sz="2200" dirty="0"/>
+              <a:t> and Wilcoxon rank sum test</a:t>
+            </a:r>
+          </a:p>
+        </p:txBody>
+      </p:sp>
+      <p:pic>
+        <p:nvPicPr>
+          <p:cNvPr id="3" name="Picture 2" descr="Chart, scatter chart&#10;&#10;Description automatically generated">
+            <a:extLst>
+              <a:ext uri="{FF2B5EF4-FFF2-40B4-BE49-F238E27FC236}">
+                <a16:creationId xmlns:a16="http://schemas.microsoft.com/office/drawing/2014/main" id="{C5DF5653-D0D8-415F-98D3-3644B4D97ADF}"/>
+              </a:ext>
+            </a:extLst>
+          </p:cNvPr>
+          <p:cNvPicPr>
+            <a:picLocks noChangeAspect="1"/>
+          </p:cNvPicPr>
+          <p:nvPr/>
+        </p:nvPicPr>
+        <p:blipFill>
+          <a:blip r:embed="rId2">
+            <a:extLst>
+              <a:ext uri="{28A0092B-C50C-407E-A947-70E740481C1C}">
+                <a14:useLocalDpi xmlns:a14="http://schemas.microsoft.com/office/drawing/2010/main" val="0"/>
+              </a:ext>
+            </a:extLst>
+          </a:blip>
+          <a:stretch>
+            <a:fillRect/>
+          </a:stretch>
+        </p:blipFill>
+        <p:spPr>
+          <a:xfrm>
+            <a:off x="5334000" y="0"/>
+            <a:ext cx="6858000" cy="6858000"/>
+          </a:xfrm>
+          <a:prstGeom prst="rect">
+            <a:avLst/>
+          </a:prstGeom>
+        </p:spPr>
+      </p:pic>
+    </p:spTree>
+    <p:extLst>
+      <p:ext uri="{BB962C8B-B14F-4D97-AF65-F5344CB8AC3E}">
+        <p14:creationId xmlns:p14="http://schemas.microsoft.com/office/powerpoint/2010/main" val="1256015159"/>
+      </p:ext>
+    </p:extLst>
+  </p:cSld>
+  <p:clrMapOvr>
+    <a:masterClrMapping/>
+  </p:clrMapOvr>
+</p:sld>
+</file>
+
+<file path=ppt/slides/slide16.xml><?xml version="1.0" encoding="utf-8"?>
+<p:sld xmlns:a="http://schemas.openxmlformats.org/drawingml/2006/main" xmlns:r="http://schemas.openxmlformats.org/officeDocument/2006/relationships" xmlns:p="http://schemas.openxmlformats.org/presentationml/2006/main">
+  <p:cSld>
+    <p:spTree>
+      <p:nvGrpSpPr>
+        <p:cNvPr id="1" name=""/>
+        <p:cNvGrpSpPr/>
+        <p:nvPr/>
+      </p:nvGrpSpPr>
+      <p:grpSpPr>
+        <a:xfrm>
+          <a:off x="0" y="0"/>
+          <a:ext cx="0" cy="0"/>
+          <a:chOff x="0" y="0"/>
+          <a:chExt cx="0" cy="0"/>
+        </a:xfrm>
+      </p:grpSpPr>
+      <p:sp>
+        <p:nvSpPr>
+          <p:cNvPr id="4" name="TextBox 3">
+            <a:extLst>
+              <a:ext uri="{FF2B5EF4-FFF2-40B4-BE49-F238E27FC236}">
+                <a16:creationId xmlns:a16="http://schemas.microsoft.com/office/drawing/2014/main" id="{CF2E4B08-A27B-441A-9BE9-971197714EED}"/>
+              </a:ext>
+            </a:extLst>
+          </p:cNvPr>
+          <p:cNvSpPr txBox="1"/>
+          <p:nvPr/>
+        </p:nvSpPr>
+        <p:spPr>
+          <a:xfrm>
+            <a:off x="207310" y="2536448"/>
+            <a:ext cx="4767943" cy="1785104"/>
+          </a:xfrm>
+          <a:prstGeom prst="rect">
+            <a:avLst/>
+          </a:prstGeom>
+          <a:noFill/>
+        </p:spPr>
+        <p:txBody>
+          <a:bodyPr wrap="square" rtlCol="0">
+            <a:spAutoFit/>
+          </a:bodyPr>
+          <a:lstStyle/>
+          <a:p>
+            <a:r>
+              <a:rPr lang="en-US" sz="2200" dirty="0"/>
+              <a:t>AUC comparison between </a:t>
+            </a:r>
+            <a:r>
+              <a:rPr lang="en-US" sz="2200" dirty="0" err="1"/>
+              <a:t>cILR</a:t>
+            </a:r>
+            <a:r>
+              <a:rPr lang="en-US" sz="2200" dirty="0"/>
+              <a:t> and other single sample gene set aggregation methods (</a:t>
+            </a:r>
+            <a:r>
+              <a:rPr lang="en-US" sz="2200" dirty="0" err="1"/>
+              <a:t>ssGSEA</a:t>
+            </a:r>
+            <a:r>
+              <a:rPr lang="en-US" sz="2200" dirty="0"/>
+              <a:t> produced identical results between count and </a:t>
+            </a:r>
+            <a:r>
+              <a:rPr lang="en-US" sz="2200" dirty="0" err="1"/>
+              <a:t>clr</a:t>
+            </a:r>
+            <a:r>
+              <a:rPr lang="en-US" sz="2200" dirty="0"/>
+              <a:t> transformed data)</a:t>
+            </a:r>
+          </a:p>
+        </p:txBody>
+      </p:sp>
+      <p:pic>
+        <p:nvPicPr>
+          <p:cNvPr id="5" name="Picture 4" descr="Graphical user interface, chart&#10;&#10;Description automatically generated">
+            <a:extLst>
+              <a:ext uri="{FF2B5EF4-FFF2-40B4-BE49-F238E27FC236}">
+                <a16:creationId xmlns:a16="http://schemas.microsoft.com/office/drawing/2014/main" id="{B43F87EC-5893-41F6-9CD9-094087353467}"/>
+              </a:ext>
+            </a:extLst>
+          </p:cNvPr>
+          <p:cNvPicPr>
+            <a:picLocks noChangeAspect="1"/>
+          </p:cNvPicPr>
+          <p:nvPr/>
+        </p:nvPicPr>
+        <p:blipFill>
+          <a:blip r:embed="rId2">
+            <a:extLst>
+              <a:ext uri="{28A0092B-C50C-407E-A947-70E740481C1C}">
+                <a14:useLocalDpi xmlns:a14="http://schemas.microsoft.com/office/drawing/2010/main" val="0"/>
+              </a:ext>
+            </a:extLst>
+          </a:blip>
+          <a:stretch>
+            <a:fillRect/>
+          </a:stretch>
+        </p:blipFill>
+        <p:spPr>
+          <a:xfrm>
+            <a:off x="5334000" y="0"/>
+            <a:ext cx="6858000" cy="6858000"/>
+          </a:xfrm>
+          <a:prstGeom prst="rect">
+            <a:avLst/>
+          </a:prstGeom>
+        </p:spPr>
+      </p:pic>
+    </p:spTree>
+    <p:extLst>
+      <p:ext uri="{BB962C8B-B14F-4D97-AF65-F5344CB8AC3E}">
+        <p14:creationId xmlns:p14="http://schemas.microsoft.com/office/powerpoint/2010/main" val="120329479"/>
+      </p:ext>
+    </p:extLst>
+  </p:cSld>
+  <p:clrMapOvr>
+    <a:masterClrMapping/>
+  </p:clrMapOvr>
+</p:sld>
+</file>
+
+<file path=ppt/slides/slide2.xml><?xml version="1.0" encoding="utf-8"?>
+<p:sld xmlns:a="http://schemas.openxmlformats.org/drawingml/2006/main" xmlns:r="http://schemas.openxmlformats.org/officeDocument/2006/relationships" xmlns:p="http://schemas.openxmlformats.org/presentationml/2006/main">
+  <p:cSld>
+    <p:spTree>
+      <p:nvGrpSpPr>
+        <p:cNvPr id="1" name=""/>
+        <p:cNvGrpSpPr/>
+        <p:nvPr/>
+      </p:nvGrpSpPr>
+      <p:grpSpPr>
+        <a:xfrm>
+          <a:off x="0" y="0"/>
+          <a:ext cx="0" cy="0"/>
+          <a:chOff x="0" y="0"/>
+          <a:chExt cx="0" cy="0"/>
+        </a:xfrm>
+      </p:grpSpPr>
+      <p:sp>
+        <p:nvSpPr>
+          <p:cNvPr id="2" name="Title 1">
+            <a:extLst>
+              <a:ext uri="{FF2B5EF4-FFF2-40B4-BE49-F238E27FC236}">
+                <a16:creationId xmlns:a16="http://schemas.microsoft.com/office/drawing/2014/main" id="{7CF924BD-DE6D-450F-84C4-ED000F448EFF}"/>
+              </a:ext>
+            </a:extLst>
+          </p:cNvPr>
+          <p:cNvSpPr>
+            <a:spLocks noGrp="1"/>
+          </p:cNvSpPr>
+          <p:nvPr>
+            <p:ph type="title"/>
+          </p:nvPr>
+        </p:nvSpPr>
+        <p:spPr/>
+        <p:txBody>
+          <a:bodyPr/>
+          <a:lstStyle/>
+          <a:p>
+            <a:r>
+              <a:rPr lang="en-US" dirty="0"/>
+              <a:t>Microbiome data is complicated</a:t>
+            </a:r>
+          </a:p>
+        </p:txBody>
+      </p:sp>
+      <p:sp>
+        <p:nvSpPr>
+          <p:cNvPr id="3" name="Content Placeholder 2">
+            <a:extLst>
+              <a:ext uri="{FF2B5EF4-FFF2-40B4-BE49-F238E27FC236}">
+                <a16:creationId xmlns:a16="http://schemas.microsoft.com/office/drawing/2014/main" id="{4CA116E2-C1EC-4C42-A340-C3A762B36592}"/>
+              </a:ext>
+            </a:extLst>
+          </p:cNvPr>
+          <p:cNvSpPr>
+            <a:spLocks noGrp="1"/>
+          </p:cNvSpPr>
+          <p:nvPr>
+            <p:ph idx="1"/>
+          </p:nvPr>
+        </p:nvSpPr>
+        <p:spPr>
+          <a:xfrm>
+            <a:off x="838200" y="2328877"/>
+            <a:ext cx="3624743" cy="2737139"/>
+          </a:xfrm>
+        </p:spPr>
+        <p:txBody>
+          <a:bodyPr/>
+          <a:lstStyle/>
+          <a:p>
+            <a:r>
+              <a:rPr lang="en-US" dirty="0"/>
+              <a:t>Data is high dimensional, compositional and sparse</a:t>
+            </a:r>
+          </a:p>
+          <a:p>
+            <a:r>
+              <a:rPr lang="en-US" dirty="0"/>
+              <a:t>Dependent on log-ratio analyses</a:t>
+            </a:r>
+          </a:p>
+        </p:txBody>
+      </p:sp>
+      <p:pic>
+        <p:nvPicPr>
+          <p:cNvPr id="5" name="Picture 4" descr="Diagram&#10;&#10;Description automatically generated">
+            <a:extLst>
+              <a:ext uri="{FF2B5EF4-FFF2-40B4-BE49-F238E27FC236}">
+                <a16:creationId xmlns:a16="http://schemas.microsoft.com/office/drawing/2014/main" id="{859C2017-7392-46A3-9EFD-95E6A6B392A2}"/>
+              </a:ext>
+            </a:extLst>
+          </p:cNvPr>
+          <p:cNvPicPr>
+            <a:picLocks noChangeAspect="1"/>
+          </p:cNvPicPr>
+          <p:nvPr/>
+        </p:nvPicPr>
+        <p:blipFill>
+          <a:blip r:embed="rId2">
+            <a:extLst>
+              <a:ext uri="{28A0092B-C50C-407E-A947-70E740481C1C}">
+                <a14:useLocalDpi xmlns:a14="http://schemas.microsoft.com/office/drawing/2010/main" val="0"/>
+              </a:ext>
+            </a:extLst>
+          </a:blip>
+          <a:stretch>
+            <a:fillRect/>
+          </a:stretch>
+        </p:blipFill>
+        <p:spPr>
+          <a:xfrm>
+            <a:off x="4711701" y="1690688"/>
+            <a:ext cx="7101607" cy="4221018"/>
+          </a:xfrm>
+          <a:prstGeom prst="rect">
+            <a:avLst/>
+          </a:prstGeom>
+        </p:spPr>
+      </p:pic>
+    </p:spTree>
+    <p:extLst>
+      <p:ext uri="{BB962C8B-B14F-4D97-AF65-F5344CB8AC3E}">
+        <p14:creationId xmlns:p14="http://schemas.microsoft.com/office/powerpoint/2010/main" val="2716468882"/>
+      </p:ext>
+    </p:extLst>
+  </p:cSld>
+  <p:clrMapOvr>
+    <a:masterClrMapping/>
+  </p:clrMapOvr>
+</p:sld>
+</file>
+
+<file path=ppt/slides/slide3.xml><?xml version="1.0" encoding="utf-8"?>
+<p:sld xmlns:a="http://schemas.openxmlformats.org/drawingml/2006/main" xmlns:r="http://schemas.openxmlformats.org/officeDocument/2006/relationships" xmlns:p="http://schemas.openxmlformats.org/presentationml/2006/main">
+  <p:cSld>
+    <p:spTree>
+      <p:nvGrpSpPr>
+        <p:cNvPr id="1" name=""/>
+        <p:cNvGrpSpPr/>
+        <p:nvPr/>
+      </p:nvGrpSpPr>
+      <p:grpSpPr>
+        <a:xfrm>
+          <a:off x="0" y="0"/>
+          <a:ext cx="0" cy="0"/>
+          <a:chOff x="0" y="0"/>
+          <a:chExt cx="0" cy="0"/>
+        </a:xfrm>
+      </p:grpSpPr>
+      <p:sp>
+        <p:nvSpPr>
+          <p:cNvPr id="2" name="Title 1">
+            <a:extLst>
+              <a:ext uri="{FF2B5EF4-FFF2-40B4-BE49-F238E27FC236}">
+                <a16:creationId xmlns:a16="http://schemas.microsoft.com/office/drawing/2014/main" id="{7CF924BD-DE6D-450F-84C4-ED000F448EFF}"/>
+              </a:ext>
+            </a:extLst>
+          </p:cNvPr>
+          <p:cNvSpPr>
+            <a:spLocks noGrp="1"/>
+          </p:cNvSpPr>
+          <p:nvPr>
+            <p:ph type="title"/>
+          </p:nvPr>
+        </p:nvSpPr>
+        <p:spPr/>
+        <p:txBody>
+          <a:bodyPr/>
+          <a:lstStyle/>
+          <a:p>
+            <a:r>
+              <a:rPr lang="en-US"/>
+              <a:t>Aggregating variables into sets can help reduce the high dimensionality burden </a:t>
+            </a:r>
+            <a:endParaRPr lang="en-US" dirty="0"/>
+          </a:p>
+        </p:txBody>
+      </p:sp>
+      <p:sp>
+        <p:nvSpPr>
+          <p:cNvPr id="3" name="Content Placeholder 2">
+            <a:extLst>
+              <a:ext uri="{FF2B5EF4-FFF2-40B4-BE49-F238E27FC236}">
+                <a16:creationId xmlns:a16="http://schemas.microsoft.com/office/drawing/2014/main" id="{4CA116E2-C1EC-4C42-A340-C3A762B36592}"/>
+              </a:ext>
+            </a:extLst>
+          </p:cNvPr>
+          <p:cNvSpPr>
+            <a:spLocks noGrp="1"/>
+          </p:cNvSpPr>
+          <p:nvPr>
+            <p:ph idx="1"/>
+          </p:nvPr>
+        </p:nvSpPr>
+        <p:spPr>
+          <a:xfrm>
+            <a:off x="838200" y="2392769"/>
+            <a:ext cx="10402455" cy="2737139"/>
+          </a:xfrm>
+        </p:spPr>
+        <p:txBody>
+          <a:bodyPr/>
+          <a:lstStyle/>
+          <a:p>
+            <a:r>
+              <a:rPr lang="en-US" dirty="0"/>
+              <a:t>Specifically for 16S data, since ASVs/OTUs do not have a grounded interpretation and must be aggregated to at least the genus level. </a:t>
+            </a:r>
+          </a:p>
+          <a:p>
+            <a:r>
+              <a:rPr lang="en-US" dirty="0"/>
+              <a:t>However, microbiome analyses rely on the naïve method by summing up compositional parts</a:t>
+            </a:r>
+          </a:p>
+          <a:p>
+            <a:pPr lvl="1"/>
+            <a:r>
+              <a:rPr lang="en-US" dirty="0"/>
+              <a:t>Not particularly appropriate if the goal is to test for differential abundance at multiple taxonomic levels </a:t>
+            </a:r>
+          </a:p>
+        </p:txBody>
+      </p:sp>
+    </p:spTree>
+    <p:extLst>
+      <p:ext uri="{BB962C8B-B14F-4D97-AF65-F5344CB8AC3E}">
+        <p14:creationId xmlns:p14="http://schemas.microsoft.com/office/powerpoint/2010/main" val="3923347547"/>
+      </p:ext>
+    </p:extLst>
+  </p:cSld>
+  <p:clrMapOvr>
+    <a:masterClrMapping/>
+  </p:clrMapOvr>
+</p:sld>
+</file>
+
+<file path=ppt/slides/slide4.xml><?xml version="1.0" encoding="utf-8"?>
+<p:sld xmlns:a="http://schemas.openxmlformats.org/drawingml/2006/main" xmlns:r="http://schemas.openxmlformats.org/officeDocument/2006/relationships" xmlns:p="http://schemas.openxmlformats.org/presentationml/2006/main">
+  <p:cSld>
+    <p:bg>
+      <p:bgPr>
+        <a:solidFill>
+          <a:schemeClr val="bg1"/>
+        </a:solidFill>
+        <a:effectLst/>
+      </p:bgPr>
+    </p:bg>
+    <p:spTree>
+      <p:nvGrpSpPr>
+        <p:cNvPr id="1" name=""/>
+        <p:cNvGrpSpPr/>
+        <p:nvPr/>
+      </p:nvGrpSpPr>
+      <p:grpSpPr>
+        <a:xfrm>
+          <a:off x="0" y="0"/>
+          <a:ext cx="0" cy="0"/>
+          <a:chOff x="0" y="0"/>
+          <a:chExt cx="0" cy="0"/>
+        </a:xfrm>
+      </p:grpSpPr>
+      <p:sp useBgFill="1">
+        <p:nvSpPr>
+          <p:cNvPr id="18" name="Rectangle 11">
+            <a:extLst>
+              <a:ext uri="{FF2B5EF4-FFF2-40B4-BE49-F238E27FC236}">
+                <a16:creationId xmlns:a16="http://schemas.microsoft.com/office/drawing/2014/main" id="{53F29798-D584-4792-9B62-3F5F5C36D619}"/>
+              </a:ext>
+              <a:ext uri="{C183D7F6-B498-43B3-948B-1728B52AA6E4}">
+                <adec:decorative xmlns:adec="http://schemas.microsoft.com/office/drawing/2017/decorative" val="1"/>
+              </a:ext>
+            </a:extLst>
+          </p:cNvPr>
+          <p:cNvSpPr>
+            <a:spLocks noGrp="1" noRot="1" noChangeAspect="1" noMove="1" noResize="1" noEditPoints="1" noAdjustHandles="1" noChangeArrowheads="1" noChangeShapeType="1" noTextEdit="1"/>
+          </p:cNvSpPr>
+          <p:nvPr>
+            <p:extLst>
+              <p:ext uri="{386F3935-93C4-4BCD-93E2-E3B085C9AB24}">
+                <p16:designElem xmlns:p16="http://schemas.microsoft.com/office/powerpoint/2015/main" val="1"/>
+              </p:ext>
+            </p:extLst>
+          </p:nvPr>
+        </p:nvSpPr>
+        <p:spPr>
+          <a:xfrm>
+            <a:off x="0" y="0"/>
+            <a:ext cx="12188952" cy="6858000"/>
+          </a:xfrm>
+          <a:prstGeom prst="rect">
+            <a:avLst/>
+          </a:prstGeom>
+          <a:ln>
+            <a:noFill/>
+          </a:ln>
+        </p:spPr>
+        <p:style>
+          <a:lnRef idx="2">
+            <a:schemeClr val="accent1">
+              <a:shade val="50000"/>
+            </a:schemeClr>
+          </a:lnRef>
+          <a:fillRef idx="1">
+            <a:schemeClr val="accent1"/>
+          </a:fillRef>
+          <a:effectRef idx="0">
+            <a:schemeClr val="accent1"/>
+          </a:effectRef>
+          <a:fontRef idx="minor">
+            <a:schemeClr val="lt1"/>
+          </a:fontRef>
+        </p:style>
+        <p:txBody>
+          <a:bodyPr rtlCol="0" anchor="ctr"/>
+          <a:lstStyle/>
+          <a:p>
+            <a:pPr algn="ctr"/>
+            <a:endParaRPr lang="en-US"/>
+          </a:p>
+        </p:txBody>
+      </p:sp>
+      <p:sp>
+        <p:nvSpPr>
+          <p:cNvPr id="2" name="Title 1">
+            <a:extLst>
+              <a:ext uri="{FF2B5EF4-FFF2-40B4-BE49-F238E27FC236}">
+                <a16:creationId xmlns:a16="http://schemas.microsoft.com/office/drawing/2014/main" id="{7CF924BD-DE6D-450F-84C4-ED000F448EFF}"/>
+              </a:ext>
+            </a:extLst>
+          </p:cNvPr>
+          <p:cNvSpPr>
+            <a:spLocks noGrp="1"/>
+          </p:cNvSpPr>
+          <p:nvPr>
+            <p:ph type="title"/>
+          </p:nvPr>
+        </p:nvSpPr>
+        <p:spPr>
+          <a:xfrm>
+            <a:off x="838200" y="184805"/>
+            <a:ext cx="10515600" cy="1505883"/>
+          </a:xfrm>
+        </p:spPr>
+        <p:txBody>
+          <a:bodyPr vert="horz" lIns="91440" tIns="45720" rIns="91440" bIns="45720" rtlCol="0" anchor="ctr">
+            <a:normAutofit/>
+          </a:bodyPr>
+          <a:lstStyle/>
+          <a:p>
+            <a:r>
+              <a:rPr lang="en-US" dirty="0"/>
+              <a:t>Gene set testing literature provides sophisticated methods to aggregate variables</a:t>
+            </a:r>
+            <a:endParaRPr lang="en-US" kern="1200" dirty="0">
+              <a:solidFill>
+                <a:schemeClr val="tx1"/>
+              </a:solidFill>
+              <a:latin typeface="+mj-lt"/>
+              <a:ea typeface="+mj-ea"/>
+              <a:cs typeface="+mj-cs"/>
+            </a:endParaRPr>
+          </a:p>
+        </p:txBody>
+      </p:sp>
+      <p:pic>
+        <p:nvPicPr>
+          <p:cNvPr id="9" name="Picture 8" descr="Diagram&#10;&#10;Description automatically generated">
+            <a:extLst>
+              <a:ext uri="{FF2B5EF4-FFF2-40B4-BE49-F238E27FC236}">
+                <a16:creationId xmlns:a16="http://schemas.microsoft.com/office/drawing/2014/main" id="{2A391BF3-2DA0-4A00-90BB-755C4C2BADB9}"/>
+              </a:ext>
+            </a:extLst>
+          </p:cNvPr>
+          <p:cNvPicPr>
+            <a:picLocks noChangeAspect="1"/>
+          </p:cNvPicPr>
+          <p:nvPr/>
+        </p:nvPicPr>
+        <p:blipFill>
+          <a:blip r:embed="rId2">
+            <a:extLst>
+              <a:ext uri="{28A0092B-C50C-407E-A947-70E740481C1C}">
+                <a14:useLocalDpi xmlns:a14="http://schemas.microsoft.com/office/drawing/2010/main" val="0"/>
+              </a:ext>
+            </a:extLst>
+          </a:blip>
+          <a:stretch>
+            <a:fillRect/>
+          </a:stretch>
+        </p:blipFill>
+        <p:spPr>
+          <a:xfrm>
+            <a:off x="2004291" y="2146012"/>
+            <a:ext cx="7721600" cy="4071938"/>
+          </a:xfrm>
+          <a:prstGeom prst="rect">
+            <a:avLst/>
+          </a:prstGeom>
+        </p:spPr>
+      </p:pic>
+    </p:spTree>
+    <p:extLst>
+      <p:ext uri="{BB962C8B-B14F-4D97-AF65-F5344CB8AC3E}">
+        <p14:creationId xmlns:p14="http://schemas.microsoft.com/office/powerpoint/2010/main" val="1014387293"/>
+      </p:ext>
+    </p:extLst>
+  </p:cSld>
+  <p:clrMapOvr>
+    <a:masterClrMapping/>
+  </p:clrMapOvr>
+</p:sld>
+</file>
+
+<file path=ppt/slides/slide5.xml><?xml version="1.0" encoding="utf-8"?>
+<p:sld xmlns:a="http://schemas.openxmlformats.org/drawingml/2006/main" xmlns:r="http://schemas.openxmlformats.org/officeDocument/2006/relationships" xmlns:p="http://schemas.openxmlformats.org/presentationml/2006/main">
+  <p:cSld>
+    <p:bg>
+      <p:bgPr>
+        <a:solidFill>
+          <a:schemeClr val="bg1"/>
+        </a:solidFill>
+        <a:effectLst/>
+      </p:bgPr>
+    </p:bg>
+    <p:spTree>
+      <p:nvGrpSpPr>
+        <p:cNvPr id="1" name=""/>
+        <p:cNvGrpSpPr/>
+        <p:nvPr/>
+      </p:nvGrpSpPr>
+      <p:grpSpPr>
+        <a:xfrm>
+          <a:off x="0" y="0"/>
+          <a:ext cx="0" cy="0"/>
+          <a:chOff x="0" y="0"/>
+          <a:chExt cx="0" cy="0"/>
+        </a:xfrm>
+      </p:grpSpPr>
+      <p:sp useBgFill="1">
+        <p:nvSpPr>
+          <p:cNvPr id="18" name="Rectangle 11">
+            <a:extLst>
+              <a:ext uri="{FF2B5EF4-FFF2-40B4-BE49-F238E27FC236}">
+                <a16:creationId xmlns:a16="http://schemas.microsoft.com/office/drawing/2014/main" id="{53F29798-D584-4792-9B62-3F5F5C36D619}"/>
+              </a:ext>
+              <a:ext uri="{C183D7F6-B498-43B3-948B-1728B52AA6E4}">
+                <adec:decorative xmlns:adec="http://schemas.microsoft.com/office/drawing/2017/decorative" val="1"/>
+              </a:ext>
+            </a:extLst>
+          </p:cNvPr>
+          <p:cNvSpPr>
+            <a:spLocks noGrp="1" noRot="1" noChangeAspect="1" noMove="1" noResize="1" noEditPoints="1" noAdjustHandles="1" noChangeArrowheads="1" noChangeShapeType="1" noTextEdit="1"/>
+          </p:cNvSpPr>
+          <p:nvPr>
+            <p:extLst>
+              <p:ext uri="{386F3935-93C4-4BCD-93E2-E3B085C9AB24}">
+                <p16:designElem xmlns:p16="http://schemas.microsoft.com/office/powerpoint/2015/main" val="1"/>
+              </p:ext>
+            </p:extLst>
+          </p:nvPr>
+        </p:nvSpPr>
+        <p:spPr>
+          <a:xfrm>
+            <a:off x="0" y="0"/>
+            <a:ext cx="12188952" cy="6858000"/>
+          </a:xfrm>
+          <a:prstGeom prst="rect">
+            <a:avLst/>
+          </a:prstGeom>
+          <a:ln>
+            <a:noFill/>
+          </a:ln>
+        </p:spPr>
+        <p:style>
+          <a:lnRef idx="2">
+            <a:schemeClr val="accent1">
+              <a:shade val="50000"/>
+            </a:schemeClr>
+          </a:lnRef>
+          <a:fillRef idx="1">
+            <a:schemeClr val="accent1"/>
+          </a:fillRef>
+          <a:effectRef idx="0">
+            <a:schemeClr val="accent1"/>
+          </a:effectRef>
+          <a:fontRef idx="minor">
+            <a:schemeClr val="lt1"/>
+          </a:fontRef>
+        </p:style>
+        <p:txBody>
+          <a:bodyPr rtlCol="0" anchor="ctr"/>
+          <a:lstStyle/>
+          <a:p>
+            <a:pPr algn="ctr"/>
+            <a:endParaRPr lang="en-US"/>
+          </a:p>
+        </p:txBody>
+      </p:sp>
+      <p:sp>
+        <p:nvSpPr>
+          <p:cNvPr id="2" name="Title 1">
+            <a:extLst>
+              <a:ext uri="{FF2B5EF4-FFF2-40B4-BE49-F238E27FC236}">
+                <a16:creationId xmlns:a16="http://schemas.microsoft.com/office/drawing/2014/main" id="{7CF924BD-DE6D-450F-84C4-ED000F448EFF}"/>
+              </a:ext>
+            </a:extLst>
+          </p:cNvPr>
+          <p:cNvSpPr>
+            <a:spLocks noGrp="1"/>
+          </p:cNvSpPr>
+          <p:nvPr>
+            <p:ph type="title"/>
+          </p:nvPr>
+        </p:nvSpPr>
+        <p:spPr>
+          <a:xfrm>
+            <a:off x="542636" y="83205"/>
+            <a:ext cx="10515600" cy="1505883"/>
+          </a:xfrm>
+        </p:spPr>
+        <p:txBody>
+          <a:bodyPr vert="horz" lIns="91440" tIns="45720" rIns="91440" bIns="45720" rtlCol="0" anchor="ctr">
+            <a:normAutofit/>
+          </a:bodyPr>
+          <a:lstStyle/>
+          <a:p>
+            <a:r>
+              <a:rPr lang="en-US" dirty="0"/>
+              <a:t>Gene set testing literature provides sophisticated methods to aggregate variables</a:t>
+            </a:r>
+            <a:endParaRPr lang="en-US" kern="1200" dirty="0">
+              <a:solidFill>
+                <a:schemeClr val="tx1"/>
+              </a:solidFill>
+              <a:latin typeface="+mj-lt"/>
+              <a:ea typeface="+mj-ea"/>
+              <a:cs typeface="+mj-cs"/>
+            </a:endParaRPr>
+          </a:p>
+        </p:txBody>
+      </p:sp>
+      <p:pic>
+        <p:nvPicPr>
+          <p:cNvPr id="11" name="Picture 10">
+            <a:extLst>
+              <a:ext uri="{FF2B5EF4-FFF2-40B4-BE49-F238E27FC236}">
+                <a16:creationId xmlns:a16="http://schemas.microsoft.com/office/drawing/2014/main" id="{54EDD5EB-88C8-4335-963F-AA92A55A597B}"/>
+              </a:ext>
+            </a:extLst>
+          </p:cNvPr>
+          <p:cNvPicPr>
+            <a:picLocks noChangeAspect="1"/>
+          </p:cNvPicPr>
+          <p:nvPr/>
+        </p:nvPicPr>
+        <p:blipFill>
+          <a:blip r:embed="rId2"/>
+          <a:stretch>
+            <a:fillRect/>
+          </a:stretch>
+        </p:blipFill>
+        <p:spPr>
+          <a:xfrm>
+            <a:off x="454025" y="1520170"/>
+            <a:ext cx="4171950" cy="5153025"/>
+          </a:xfrm>
+          <a:prstGeom prst="rect">
+            <a:avLst/>
+          </a:prstGeom>
+        </p:spPr>
+      </p:pic>
+      <p:sp>
+        <p:nvSpPr>
+          <p:cNvPr id="12" name="TextBox 11">
+            <a:extLst>
+              <a:ext uri="{FF2B5EF4-FFF2-40B4-BE49-F238E27FC236}">
+                <a16:creationId xmlns:a16="http://schemas.microsoft.com/office/drawing/2014/main" id="{7E0995B4-6ED4-4DF7-9E17-675E29265EFE}"/>
+              </a:ext>
+            </a:extLst>
+          </p:cNvPr>
+          <p:cNvSpPr txBox="1"/>
+          <p:nvPr/>
+        </p:nvSpPr>
+        <p:spPr>
+          <a:xfrm>
+            <a:off x="10002981" y="6488668"/>
+            <a:ext cx="2189019" cy="369332"/>
+          </a:xfrm>
+          <a:prstGeom prst="rect">
+            <a:avLst/>
+          </a:prstGeom>
+          <a:noFill/>
+        </p:spPr>
+        <p:txBody>
+          <a:bodyPr wrap="square" rtlCol="0">
+            <a:spAutoFit/>
+          </a:bodyPr>
+          <a:lstStyle/>
+          <a:p>
+            <a:pPr algn="r"/>
+            <a:r>
+              <a:rPr lang="en-US" dirty="0"/>
+              <a:t>Tian et al. 2005</a:t>
+            </a:r>
+          </a:p>
+        </p:txBody>
+      </p:sp>
+      <p:sp>
+        <p:nvSpPr>
+          <p:cNvPr id="14" name="Rectangle 13">
+            <a:extLst>
+              <a:ext uri="{FF2B5EF4-FFF2-40B4-BE49-F238E27FC236}">
+                <a16:creationId xmlns:a16="http://schemas.microsoft.com/office/drawing/2014/main" id="{D0FB1941-BD0B-420F-9EA1-C9A70EFA46F4}"/>
+              </a:ext>
+            </a:extLst>
+          </p:cNvPr>
+          <p:cNvSpPr/>
+          <p:nvPr/>
+        </p:nvSpPr>
+        <p:spPr>
+          <a:xfrm>
+            <a:off x="2701255" y="3203108"/>
+            <a:ext cx="1862355" cy="655827"/>
+          </a:xfrm>
+          <a:prstGeom prst="rect">
+            <a:avLst/>
+          </a:prstGeom>
+          <a:noFill/>
+          <a:ln>
+            <a:solidFill>
+              <a:srgbClr val="FF0000"/>
+            </a:solidFill>
+          </a:ln>
+        </p:spPr>
+        <p:style>
+          <a:lnRef idx="2">
+            <a:schemeClr val="accent1">
+              <a:shade val="50000"/>
+            </a:schemeClr>
+          </a:lnRef>
+          <a:fillRef idx="1">
+            <a:schemeClr val="accent1"/>
+          </a:fillRef>
+          <a:effectRef idx="0">
+            <a:schemeClr val="accent1"/>
+          </a:effectRef>
+          <a:fontRef idx="minor">
+            <a:schemeClr val="lt1"/>
+          </a:fontRef>
+        </p:style>
+        <p:txBody>
+          <a:bodyPr rtlCol="0" anchor="ctr"/>
+          <a:lstStyle/>
+          <a:p>
+            <a:pPr algn="ctr"/>
+            <a:endParaRPr lang="en-US"/>
+          </a:p>
+        </p:txBody>
+      </p:sp>
+      <p:sp>
+        <p:nvSpPr>
+          <p:cNvPr id="15" name="Rectangle 14">
+            <a:extLst>
+              <a:ext uri="{FF2B5EF4-FFF2-40B4-BE49-F238E27FC236}">
+                <a16:creationId xmlns:a16="http://schemas.microsoft.com/office/drawing/2014/main" id="{864935B0-A62B-4620-AD2D-8906A5BB1AFD}"/>
+              </a:ext>
+            </a:extLst>
+          </p:cNvPr>
+          <p:cNvSpPr/>
+          <p:nvPr/>
+        </p:nvSpPr>
+        <p:spPr>
+          <a:xfrm>
+            <a:off x="2669096" y="3887240"/>
+            <a:ext cx="1862355" cy="655827"/>
+          </a:xfrm>
+          <a:prstGeom prst="rect">
+            <a:avLst/>
+          </a:prstGeom>
+          <a:noFill/>
+          <a:ln>
+            <a:solidFill>
+              <a:srgbClr val="FF0000"/>
+            </a:solidFill>
+          </a:ln>
+        </p:spPr>
+        <p:style>
+          <a:lnRef idx="2">
+            <a:schemeClr val="accent1">
+              <a:shade val="50000"/>
+            </a:schemeClr>
+          </a:lnRef>
+          <a:fillRef idx="1">
+            <a:schemeClr val="accent1"/>
+          </a:fillRef>
+          <a:effectRef idx="0">
+            <a:schemeClr val="accent1"/>
+          </a:effectRef>
+          <a:fontRef idx="minor">
+            <a:schemeClr val="lt1"/>
+          </a:fontRef>
+        </p:style>
+        <p:txBody>
+          <a:bodyPr rtlCol="0" anchor="ctr"/>
+          <a:lstStyle/>
+          <a:p>
+            <a:pPr algn="ctr"/>
+            <a:endParaRPr lang="en-US"/>
+          </a:p>
+        </p:txBody>
+      </p:sp>
+      <p:cxnSp>
+        <p:nvCxnSpPr>
+          <p:cNvPr id="19" name="Straight Arrow Connector 18">
+            <a:extLst>
+              <a:ext uri="{FF2B5EF4-FFF2-40B4-BE49-F238E27FC236}">
+                <a16:creationId xmlns:a16="http://schemas.microsoft.com/office/drawing/2014/main" id="{80A289CF-DAAF-4547-B9D6-D3578E3C1DB6}"/>
+              </a:ext>
+            </a:extLst>
+          </p:cNvPr>
+          <p:cNvCxnSpPr>
+            <a:stCxn id="14" idx="3"/>
+          </p:cNvCxnSpPr>
+          <p:nvPr/>
+        </p:nvCxnSpPr>
+        <p:spPr>
+          <a:xfrm flipV="1">
+            <a:off x="4563610" y="2952925"/>
+            <a:ext cx="2189528" cy="578097"/>
+          </a:xfrm>
+          <a:prstGeom prst="straightConnector1">
+            <a:avLst/>
+          </a:prstGeom>
+          <a:ln>
+            <a:tailEnd type="triangle"/>
+          </a:ln>
+        </p:spPr>
+        <p:style>
+          <a:lnRef idx="1">
+            <a:schemeClr val="accent1"/>
+          </a:lnRef>
+          <a:fillRef idx="0">
+            <a:schemeClr val="accent1"/>
+          </a:fillRef>
+          <a:effectRef idx="0">
+            <a:schemeClr val="accent1"/>
+          </a:effectRef>
+          <a:fontRef idx="minor">
+            <a:schemeClr val="tx1"/>
+          </a:fontRef>
+        </p:style>
+      </p:cxnSp>
+      <p:sp>
+        <p:nvSpPr>
+          <p:cNvPr id="20" name="TextBox 19">
+            <a:extLst>
+              <a:ext uri="{FF2B5EF4-FFF2-40B4-BE49-F238E27FC236}">
+                <a16:creationId xmlns:a16="http://schemas.microsoft.com/office/drawing/2014/main" id="{A396FDD6-D66A-4143-BD94-8DFDC4C3BA2F}"/>
+              </a:ext>
+            </a:extLst>
+          </p:cNvPr>
+          <p:cNvSpPr txBox="1"/>
+          <p:nvPr/>
+        </p:nvSpPr>
+        <p:spPr>
+          <a:xfrm>
+            <a:off x="6747341" y="2625012"/>
+            <a:ext cx="2189528" cy="646331"/>
+          </a:xfrm>
+          <a:prstGeom prst="rect">
+            <a:avLst/>
+          </a:prstGeom>
+        </p:spPr>
+        <p:style>
+          <a:lnRef idx="2">
+            <a:schemeClr val="dk1"/>
+          </a:lnRef>
+          <a:fillRef idx="1">
+            <a:schemeClr val="lt1"/>
+          </a:fillRef>
+          <a:effectRef idx="0">
+            <a:schemeClr val="dk1"/>
+          </a:effectRef>
+          <a:fontRef idx="minor">
+            <a:schemeClr val="dk1"/>
+          </a:fontRef>
+        </p:style>
+        <p:txBody>
+          <a:bodyPr wrap="square" rtlCol="0">
+            <a:spAutoFit/>
+          </a:bodyPr>
+          <a:lstStyle/>
+          <a:p>
+            <a:r>
+              <a:rPr lang="en-US" dirty="0"/>
+              <a:t>Competitive gene set testing</a:t>
+            </a:r>
+          </a:p>
+        </p:txBody>
+      </p:sp>
+      <p:sp>
+        <p:nvSpPr>
+          <p:cNvPr id="22" name="TextBox 21">
+            <a:extLst>
+              <a:ext uri="{FF2B5EF4-FFF2-40B4-BE49-F238E27FC236}">
+                <a16:creationId xmlns:a16="http://schemas.microsoft.com/office/drawing/2014/main" id="{001149D8-B6BF-497C-8183-5431B93715C2}"/>
+              </a:ext>
+            </a:extLst>
+          </p:cNvPr>
+          <p:cNvSpPr txBox="1"/>
+          <p:nvPr/>
+        </p:nvSpPr>
+        <p:spPr>
+          <a:xfrm>
+            <a:off x="6746522" y="3872933"/>
+            <a:ext cx="2189528" cy="646331"/>
+          </a:xfrm>
+          <a:prstGeom prst="rect">
+            <a:avLst/>
+          </a:prstGeom>
+        </p:spPr>
+        <p:style>
+          <a:lnRef idx="2">
+            <a:schemeClr val="dk1"/>
+          </a:lnRef>
+          <a:fillRef idx="1">
+            <a:schemeClr val="lt1"/>
+          </a:fillRef>
+          <a:effectRef idx="0">
+            <a:schemeClr val="dk1"/>
+          </a:effectRef>
+          <a:fontRef idx="minor">
+            <a:schemeClr val="dk1"/>
+          </a:fontRef>
+        </p:style>
+        <p:txBody>
+          <a:bodyPr wrap="square" rtlCol="0">
+            <a:spAutoFit/>
+          </a:bodyPr>
+          <a:lstStyle/>
+          <a:p>
+            <a:r>
+              <a:rPr lang="en-US" dirty="0"/>
+              <a:t>Self-contained hypothesis</a:t>
+            </a:r>
+          </a:p>
+        </p:txBody>
+      </p:sp>
+      <p:cxnSp>
+        <p:nvCxnSpPr>
+          <p:cNvPr id="23" name="Straight Arrow Connector 22">
+            <a:extLst>
+              <a:ext uri="{FF2B5EF4-FFF2-40B4-BE49-F238E27FC236}">
+                <a16:creationId xmlns:a16="http://schemas.microsoft.com/office/drawing/2014/main" id="{2D0684E9-AEAE-4824-B6FC-3E901A119BAD}"/>
+              </a:ext>
+            </a:extLst>
+          </p:cNvPr>
+          <p:cNvCxnSpPr>
+            <a:cxnSpLocks/>
+            <a:stCxn id="15" idx="3"/>
+            <a:endCxn id="22" idx="1"/>
+          </p:cNvCxnSpPr>
+          <p:nvPr/>
+        </p:nvCxnSpPr>
+        <p:spPr>
+          <a:xfrm flipV="1">
+            <a:off x="4531451" y="4196099"/>
+            <a:ext cx="2215071" cy="19055"/>
+          </a:xfrm>
+          <a:prstGeom prst="straightConnector1">
+            <a:avLst/>
+          </a:prstGeom>
+          <a:ln>
+            <a:tailEnd type="triangle"/>
+          </a:ln>
+        </p:spPr>
+        <p:style>
+          <a:lnRef idx="1">
+            <a:schemeClr val="accent1"/>
+          </a:lnRef>
+          <a:fillRef idx="0">
+            <a:schemeClr val="accent1"/>
+          </a:fillRef>
+          <a:effectRef idx="0">
+            <a:schemeClr val="accent1"/>
+          </a:effectRef>
+          <a:fontRef idx="minor">
+            <a:schemeClr val="tx1"/>
+          </a:fontRef>
+        </p:style>
+      </p:cxnSp>
+    </p:spTree>
+    <p:extLst>
+      <p:ext uri="{BB962C8B-B14F-4D97-AF65-F5344CB8AC3E}">
+        <p14:creationId xmlns:p14="http://schemas.microsoft.com/office/powerpoint/2010/main" val="610515530"/>
+      </p:ext>
+    </p:extLst>
+  </p:cSld>
+  <p:clrMapOvr>
+    <a:masterClrMapping/>
+  </p:clrMapOvr>
+</p:sld>
+</file>
+
+<file path=ppt/slides/slide6.xml><?xml version="1.0" encoding="utf-8"?>
+<p:sld xmlns:a="http://schemas.openxmlformats.org/drawingml/2006/main" xmlns:r="http://schemas.openxmlformats.org/officeDocument/2006/relationships" xmlns:p="http://schemas.openxmlformats.org/presentationml/2006/main">
+  <p:cSld>
+    <p:bg>
+      <p:bgPr>
+        <a:solidFill>
+          <a:schemeClr val="bg1"/>
+        </a:solidFill>
+        <a:effectLst/>
+      </p:bgPr>
+    </p:bg>
+    <p:spTree>
+      <p:nvGrpSpPr>
+        <p:cNvPr id="1" name=""/>
+        <p:cNvGrpSpPr/>
+        <p:nvPr/>
+      </p:nvGrpSpPr>
+      <p:grpSpPr>
+        <a:xfrm>
+          <a:off x="0" y="0"/>
+          <a:ext cx="0" cy="0"/>
+          <a:chOff x="0" y="0"/>
+          <a:chExt cx="0" cy="0"/>
+        </a:xfrm>
+      </p:grpSpPr>
+      <p:sp useBgFill="1">
+        <p:nvSpPr>
+          <p:cNvPr id="18" name="Rectangle 11">
+            <a:extLst>
+              <a:ext uri="{FF2B5EF4-FFF2-40B4-BE49-F238E27FC236}">
+                <a16:creationId xmlns:a16="http://schemas.microsoft.com/office/drawing/2014/main" id="{53F29798-D584-4792-9B62-3F5F5C36D619}"/>
+              </a:ext>
+              <a:ext uri="{C183D7F6-B498-43B3-948B-1728B52AA6E4}">
+                <adec:decorative xmlns:adec="http://schemas.microsoft.com/office/drawing/2017/decorative" val="1"/>
+              </a:ext>
+            </a:extLst>
+          </p:cNvPr>
+          <p:cNvSpPr>
+            <a:spLocks noGrp="1" noRot="1" noChangeAspect="1" noMove="1" noResize="1" noEditPoints="1" noAdjustHandles="1" noChangeArrowheads="1" noChangeShapeType="1" noTextEdit="1"/>
+          </p:cNvSpPr>
+          <p:nvPr>
+            <p:extLst>
+              <p:ext uri="{386F3935-93C4-4BCD-93E2-E3B085C9AB24}">
+                <p16:designElem xmlns:p16="http://schemas.microsoft.com/office/powerpoint/2015/main" val="1"/>
+              </p:ext>
+            </p:extLst>
+          </p:nvPr>
+        </p:nvSpPr>
+        <p:spPr>
+          <a:xfrm>
+            <a:off x="0" y="0"/>
+            <a:ext cx="12188952" cy="6858000"/>
+          </a:xfrm>
+          <a:prstGeom prst="rect">
+            <a:avLst/>
+          </a:prstGeom>
+          <a:ln>
+            <a:noFill/>
+          </a:ln>
+        </p:spPr>
+        <p:style>
+          <a:lnRef idx="2">
+            <a:schemeClr val="accent1">
+              <a:shade val="50000"/>
+            </a:schemeClr>
+          </a:lnRef>
+          <a:fillRef idx="1">
+            <a:schemeClr val="accent1"/>
+          </a:fillRef>
+          <a:effectRef idx="0">
+            <a:schemeClr val="accent1"/>
+          </a:effectRef>
+          <a:fontRef idx="minor">
+            <a:schemeClr val="lt1"/>
+          </a:fontRef>
+        </p:style>
+        <p:txBody>
+          <a:bodyPr rtlCol="0" anchor="ctr"/>
+          <a:lstStyle/>
+          <a:p>
+            <a:pPr algn="ctr"/>
+            <a:endParaRPr lang="en-US"/>
+          </a:p>
+        </p:txBody>
+      </p:sp>
+      <p:sp>
+        <p:nvSpPr>
+          <p:cNvPr id="2" name="Title 1">
+            <a:extLst>
+              <a:ext uri="{FF2B5EF4-FFF2-40B4-BE49-F238E27FC236}">
+                <a16:creationId xmlns:a16="http://schemas.microsoft.com/office/drawing/2014/main" id="{7CF924BD-DE6D-450F-84C4-ED000F448EFF}"/>
+              </a:ext>
+            </a:extLst>
+          </p:cNvPr>
+          <p:cNvSpPr>
+            <a:spLocks noGrp="1"/>
+          </p:cNvSpPr>
+          <p:nvPr>
+            <p:ph type="title"/>
+          </p:nvPr>
+        </p:nvSpPr>
+        <p:spPr>
+          <a:xfrm>
+            <a:off x="542636" y="83205"/>
+            <a:ext cx="10515600" cy="1505883"/>
+          </a:xfrm>
+        </p:spPr>
+        <p:txBody>
+          <a:bodyPr vert="horz" lIns="91440" tIns="45720" rIns="91440" bIns="45720" rtlCol="0" anchor="ctr">
+            <a:normAutofit/>
+          </a:bodyPr>
+          <a:lstStyle/>
+          <a:p>
+            <a:r>
+              <a:rPr lang="en-US" dirty="0"/>
+              <a:t>Taxonomic enrichment using isometric log ratio transform</a:t>
+            </a:r>
+            <a:endParaRPr lang="en-US" kern="1200" dirty="0">
+              <a:solidFill>
+                <a:schemeClr val="tx1"/>
+              </a:solidFill>
+              <a:latin typeface="+mj-lt"/>
+              <a:ea typeface="+mj-ea"/>
+              <a:cs typeface="+mj-cs"/>
+            </a:endParaRPr>
+          </a:p>
+        </p:txBody>
+      </p:sp>
+      <p:sp>
+        <p:nvSpPr>
+          <p:cNvPr id="3" name="TextBox 2">
+            <a:extLst>
+              <a:ext uri="{FF2B5EF4-FFF2-40B4-BE49-F238E27FC236}">
+                <a16:creationId xmlns:a16="http://schemas.microsoft.com/office/drawing/2014/main" id="{AD97D08B-2B62-4DF4-B355-1A481319BF03}"/>
+              </a:ext>
+            </a:extLst>
+          </p:cNvPr>
+          <p:cNvSpPr txBox="1"/>
+          <p:nvPr/>
+        </p:nvSpPr>
+        <p:spPr>
+          <a:xfrm>
+            <a:off x="542636" y="2769572"/>
+            <a:ext cx="11014745" cy="1692771"/>
+          </a:xfrm>
+          <a:prstGeom prst="rect">
+            <a:avLst/>
+          </a:prstGeom>
+          <a:noFill/>
+        </p:spPr>
+        <p:txBody>
+          <a:bodyPr wrap="square" rtlCol="0">
+            <a:spAutoFit/>
+          </a:bodyPr>
+          <a:lstStyle/>
+          <a:p>
+            <a:pPr marL="457200" indent="-457200">
+              <a:buFont typeface="Arial" panose="020B0604020202020204" pitchFamily="34" charset="0"/>
+              <a:buChar char="•"/>
+            </a:pPr>
+            <a:r>
+              <a:rPr lang="en-US" sz="2600" dirty="0"/>
+              <a:t>Unsupervised competitive taxonomic enrichment method in order to reduce the dimensionality of the data. </a:t>
+            </a:r>
+          </a:p>
+          <a:p>
+            <a:pPr marL="457200" indent="-457200">
+              <a:buFont typeface="Arial" panose="020B0604020202020204" pitchFamily="34" charset="0"/>
+              <a:buChar char="•"/>
+            </a:pPr>
+            <a:r>
+              <a:rPr lang="en-US" sz="2600" dirty="0"/>
+              <a:t>Respects the compositional nature of microbiome relative abundance data</a:t>
+            </a:r>
+          </a:p>
+          <a:p>
+            <a:pPr marL="914400" lvl="1" indent="-457200">
+              <a:buFont typeface="Arial" panose="020B0604020202020204" pitchFamily="34" charset="0"/>
+              <a:buChar char="•"/>
+            </a:pPr>
+            <a:r>
+              <a:rPr lang="en-US" sz="2600" dirty="0"/>
+              <a:t>Isometric log-ratio is a natural fit  (</a:t>
+            </a:r>
+            <a:r>
+              <a:rPr lang="en-US" sz="2600" dirty="0" err="1"/>
+              <a:t>Egozcue</a:t>
+            </a:r>
+            <a:r>
+              <a:rPr lang="en-US" sz="2600" dirty="0"/>
+              <a:t> et al. 2005)</a:t>
+            </a:r>
+          </a:p>
+        </p:txBody>
+      </p:sp>
+    </p:spTree>
+    <p:extLst>
+      <p:ext uri="{BB962C8B-B14F-4D97-AF65-F5344CB8AC3E}">
+        <p14:creationId xmlns:p14="http://schemas.microsoft.com/office/powerpoint/2010/main" val="2303075583"/>
+      </p:ext>
+    </p:extLst>
+  </p:cSld>
+  <p:clrMapOvr>
+    <a:masterClrMapping/>
+  </p:clrMapOvr>
+</p:sld>
+</file>
+
+<file path=ppt/slides/slide7.xml><?xml version="1.0" encoding="utf-8"?>
+<p:sld xmlns:a="http://schemas.openxmlformats.org/drawingml/2006/main" xmlns:r="http://schemas.openxmlformats.org/officeDocument/2006/relationships" xmlns:p="http://schemas.openxmlformats.org/presentationml/2006/main">
+  <p:cSld>
+    <p:spTree>
+      <p:nvGrpSpPr>
+        <p:cNvPr id="1" name=""/>
+        <p:cNvGrpSpPr/>
+        <p:nvPr/>
+      </p:nvGrpSpPr>
+      <p:grpSpPr>
+        <a:xfrm>
+          <a:off x="0" y="0"/>
+          <a:ext cx="0" cy="0"/>
+          <a:chOff x="0" y="0"/>
+          <a:chExt cx="0" cy="0"/>
+        </a:xfrm>
+      </p:grpSpPr>
+      <p:sp>
+        <p:nvSpPr>
+          <p:cNvPr id="2" name="Title 1">
+            <a:extLst>
+              <a:ext uri="{FF2B5EF4-FFF2-40B4-BE49-F238E27FC236}">
                 <a16:creationId xmlns:a16="http://schemas.microsoft.com/office/drawing/2014/main" id="{E5F8FB7E-72FB-4C98-98F3-687B0AC284BB}"/>
               </a:ext>
             </a:extLst>
@@ -3347,7 +5364,7 @@
           <a:p>
             <a:r>
               <a:rPr lang="en-US" dirty="0"/>
-              <a:t>Review</a:t>
+              <a:t>Isometric log-ratio transformation</a:t>
             </a:r>
           </a:p>
         </p:txBody>
@@ -3372,7 +5389,7 @@
             </p:nvSpPr>
             <p:spPr>
               <a:xfrm>
-                <a:off x="838200" y="1825625"/>
+                <a:off x="838200" y="1580530"/>
                 <a:ext cx="10515600" cy="727075"/>
               </a:xfrm>
             </p:spPr>
@@ -3460,7 +5477,7 @@
             </p:nvSpPr>
             <p:spPr>
               <a:xfrm>
-                <a:off x="838200" y="1825625"/>
+                <a:off x="838200" y="1580530"/>
                 <a:ext cx="10515600" cy="727075"/>
               </a:xfrm>
               <a:blipFill>
@@ -3501,8 +5518,8 @@
             </p:nvSpPr>
             <p:spPr>
               <a:xfrm>
-                <a:off x="1879600" y="2899741"/>
-                <a:ext cx="8001000" cy="1456361"/>
+                <a:off x="940034" y="2794829"/>
+                <a:ext cx="4672201" cy="1456361"/>
               </a:xfrm>
               <a:prstGeom prst="rect">
                 <a:avLst/>
@@ -3515,10 +5532,11 @@
               </a:bodyPr>
               <a:lstStyle/>
               <a:p>
+                <a:pPr/>
                 <a14:m>
                   <m:oMathPara xmlns:m="http://schemas.openxmlformats.org/officeDocument/2006/math">
                     <m:oMathParaPr>
-                      <m:jc m:val="centerGroup"/>
+                      <m:jc m:val="left"/>
                     </m:oMathParaPr>
                     <m:oMath xmlns:m="http://schemas.openxmlformats.org/officeDocument/2006/math">
                       <m:rad>
@@ -3744,8 +5762,8 @@
             </p:nvSpPr>
             <p:spPr>
               <a:xfrm>
-                <a:off x="1879600" y="2899741"/>
-                <a:ext cx="8001000" cy="1456361"/>
+                <a:off x="940034" y="2794829"/>
+                <a:ext cx="4672201" cy="1456361"/>
               </a:xfrm>
               <a:prstGeom prst="rect">
                 <a:avLst/>
@@ -3774,10 +5792,155 @@
       </mc:AlternateContent>
       <p:sp>
         <p:nvSpPr>
-          <p:cNvPr id="5" name="TextBox 4">
-            <a:extLst>
-              <a:ext uri="{FF2B5EF4-FFF2-40B4-BE49-F238E27FC236}">
-                <a16:creationId xmlns:a16="http://schemas.microsoft.com/office/drawing/2014/main" id="{CF67853D-6213-418C-BE6F-F0FDBB8A9465}"/>
+          <p:cNvPr id="6" name="Rectangle 5">
+            <a:extLst>
+              <a:ext uri="{FF2B5EF4-FFF2-40B4-BE49-F238E27FC236}">
+                <a16:creationId xmlns:a16="http://schemas.microsoft.com/office/drawing/2014/main" id="{33C7E404-640A-47F2-91F5-536659B0F037}"/>
+              </a:ext>
+            </a:extLst>
+          </p:cNvPr>
+          <p:cNvSpPr/>
+          <p:nvPr/>
+        </p:nvSpPr>
+        <p:spPr>
+          <a:xfrm>
+            <a:off x="3742886" y="2906093"/>
+            <a:ext cx="1862355" cy="655827"/>
+          </a:xfrm>
+          <a:prstGeom prst="rect">
+            <a:avLst/>
+          </a:prstGeom>
+          <a:noFill/>
+          <a:ln>
+            <a:solidFill>
+              <a:srgbClr val="FF0000"/>
+            </a:solidFill>
+          </a:ln>
+        </p:spPr>
+        <p:style>
+          <a:lnRef idx="2">
+            <a:schemeClr val="accent1">
+              <a:shade val="50000"/>
+            </a:schemeClr>
+          </a:lnRef>
+          <a:fillRef idx="1">
+            <a:schemeClr val="accent1"/>
+          </a:fillRef>
+          <a:effectRef idx="0">
+            <a:schemeClr val="accent1"/>
+          </a:effectRef>
+          <a:fontRef idx="minor">
+            <a:schemeClr val="lt1"/>
+          </a:fontRef>
+        </p:style>
+        <p:txBody>
+          <a:bodyPr rtlCol="0" anchor="ctr"/>
+          <a:lstStyle/>
+          <a:p>
+            <a:pPr algn="ctr"/>
+            <a:endParaRPr lang="en-US"/>
+          </a:p>
+        </p:txBody>
+      </p:sp>
+      <p:sp>
+        <p:nvSpPr>
+          <p:cNvPr id="7" name="Rectangle 6">
+            <a:extLst>
+              <a:ext uri="{FF2B5EF4-FFF2-40B4-BE49-F238E27FC236}">
+                <a16:creationId xmlns:a16="http://schemas.microsoft.com/office/drawing/2014/main" id="{C2A8AB53-F9C0-4152-BA53-59EB55553E6F}"/>
+              </a:ext>
+            </a:extLst>
+          </p:cNvPr>
+          <p:cNvSpPr/>
+          <p:nvPr/>
+        </p:nvSpPr>
+        <p:spPr>
+          <a:xfrm>
+            <a:off x="3759665" y="3595363"/>
+            <a:ext cx="1862355" cy="655827"/>
+          </a:xfrm>
+          <a:prstGeom prst="rect">
+            <a:avLst/>
+          </a:prstGeom>
+          <a:noFill/>
+          <a:ln>
+            <a:solidFill>
+              <a:srgbClr val="FF0000"/>
+            </a:solidFill>
+          </a:ln>
+        </p:spPr>
+        <p:style>
+          <a:lnRef idx="2">
+            <a:schemeClr val="accent1">
+              <a:shade val="50000"/>
+            </a:schemeClr>
+          </a:lnRef>
+          <a:fillRef idx="1">
+            <a:schemeClr val="accent1"/>
+          </a:fillRef>
+          <a:effectRef idx="0">
+            <a:schemeClr val="accent1"/>
+          </a:effectRef>
+          <a:fontRef idx="minor">
+            <a:schemeClr val="lt1"/>
+          </a:fontRef>
+        </p:style>
+        <p:txBody>
+          <a:bodyPr rtlCol="0" anchor="ctr"/>
+          <a:lstStyle/>
+          <a:p>
+            <a:pPr algn="ctr"/>
+            <a:endParaRPr lang="en-US"/>
+          </a:p>
+        </p:txBody>
+      </p:sp>
+      <p:cxnSp>
+        <p:nvCxnSpPr>
+          <p:cNvPr id="8" name="Straight Arrow Connector 7">
+            <a:extLst>
+              <a:ext uri="{FF2B5EF4-FFF2-40B4-BE49-F238E27FC236}">
+                <a16:creationId xmlns:a16="http://schemas.microsoft.com/office/drawing/2014/main" id="{FACE96E0-AF12-4AE2-A05E-0F9177F6851F}"/>
+              </a:ext>
+            </a:extLst>
+          </p:cNvPr>
+          <p:cNvCxnSpPr>
+            <a:stCxn id="6" idx="3"/>
+          </p:cNvCxnSpPr>
+          <p:nvPr/>
+        </p:nvCxnSpPr>
+        <p:spPr>
+          <a:xfrm flipV="1">
+            <a:off x="5605241" y="2655910"/>
+            <a:ext cx="2189528" cy="578097"/>
+          </a:xfrm>
+          <a:prstGeom prst="straightConnector1">
+            <a:avLst/>
+          </a:prstGeom>
+          <a:ln>
+            <a:tailEnd type="triangle"/>
+          </a:ln>
+        </p:spPr>
+        <p:style>
+          <a:lnRef idx="1">
+            <a:schemeClr val="accent1"/>
+          </a:lnRef>
+          <a:fillRef idx="0">
+            <a:schemeClr val="accent1"/>
+          </a:fillRef>
+          <a:effectRef idx="0">
+            <a:schemeClr val="accent1"/>
+          </a:effectRef>
+          <a:fontRef idx="minor">
+            <a:schemeClr val="tx1"/>
+          </a:fontRef>
+        </p:style>
+      </p:cxnSp>
+      <p:sp>
+        <p:nvSpPr>
+          <p:cNvPr id="9" name="TextBox 8">
+            <a:extLst>
+              <a:ext uri="{FF2B5EF4-FFF2-40B4-BE49-F238E27FC236}">
+                <a16:creationId xmlns:a16="http://schemas.microsoft.com/office/drawing/2014/main" id="{AEF5F516-5035-44B1-9F89-99C217D5AB72}"/>
               </a:ext>
             </a:extLst>
           </p:cNvPr>
@@ -3786,8 +5949,147 @@
         </p:nvSpPr>
         <p:spPr>
           <a:xfrm>
-            <a:off x="838200" y="4813300"/>
-            <a:ext cx="9626600" cy="707886"/>
+            <a:off x="7837910" y="2333135"/>
+            <a:ext cx="2189528" cy="923330"/>
+          </a:xfrm>
+          <a:prstGeom prst="rect">
+            <a:avLst/>
+          </a:prstGeom>
+        </p:spPr>
+        <p:style>
+          <a:lnRef idx="2">
+            <a:schemeClr val="dk1"/>
+          </a:lnRef>
+          <a:fillRef idx="1">
+            <a:schemeClr val="lt1"/>
+          </a:fillRef>
+          <a:effectRef idx="0">
+            <a:schemeClr val="dk1"/>
+          </a:effectRef>
+          <a:fontRef idx="minor">
+            <a:schemeClr val="dk1"/>
+          </a:fontRef>
+        </p:style>
+        <p:txBody>
+          <a:bodyPr wrap="square" rtlCol="0">
+            <a:spAutoFit/>
+          </a:bodyPr>
+          <a:lstStyle/>
+          <a:p>
+            <a:r>
+              <a:rPr lang="en-US" dirty="0"/>
+              <a:t>Geometric mean of proportions of taxa within the set</a:t>
+            </a:r>
+          </a:p>
+        </p:txBody>
+      </p:sp>
+      <p:sp>
+        <p:nvSpPr>
+          <p:cNvPr id="10" name="TextBox 9">
+            <a:extLst>
+              <a:ext uri="{FF2B5EF4-FFF2-40B4-BE49-F238E27FC236}">
+                <a16:creationId xmlns:a16="http://schemas.microsoft.com/office/drawing/2014/main" id="{AEA5821E-A491-45C8-A906-7D76EB90FE3C}"/>
+              </a:ext>
+            </a:extLst>
+          </p:cNvPr>
+          <p:cNvSpPr txBox="1"/>
+          <p:nvPr/>
+        </p:nvSpPr>
+        <p:spPr>
+          <a:xfrm>
+            <a:off x="7837091" y="4042721"/>
+            <a:ext cx="2189528" cy="923330"/>
+          </a:xfrm>
+          <a:prstGeom prst="rect">
+            <a:avLst/>
+          </a:prstGeom>
+        </p:spPr>
+        <p:style>
+          <a:lnRef idx="2">
+            <a:schemeClr val="dk1"/>
+          </a:lnRef>
+          <a:fillRef idx="1">
+            <a:schemeClr val="lt1"/>
+          </a:fillRef>
+          <a:effectRef idx="0">
+            <a:schemeClr val="dk1"/>
+          </a:effectRef>
+          <a:fontRef idx="minor">
+            <a:schemeClr val="dk1"/>
+          </a:fontRef>
+        </p:style>
+        <p:txBody>
+          <a:bodyPr wrap="square" rtlCol="0">
+            <a:spAutoFit/>
+          </a:bodyPr>
+          <a:lstStyle/>
+          <a:p>
+            <a:r>
+              <a:rPr lang="en-US" dirty="0"/>
+              <a:t>Geometric mean of proportions of taxa outside the set</a:t>
+            </a:r>
+          </a:p>
+        </p:txBody>
+      </p:sp>
+      <p:cxnSp>
+        <p:nvCxnSpPr>
+          <p:cNvPr id="11" name="Straight Arrow Connector 10">
+            <a:extLst>
+              <a:ext uri="{FF2B5EF4-FFF2-40B4-BE49-F238E27FC236}">
+                <a16:creationId xmlns:a16="http://schemas.microsoft.com/office/drawing/2014/main" id="{11C27035-6CCB-4376-B87B-3BBCAAEA4C7C}"/>
+              </a:ext>
+            </a:extLst>
+          </p:cNvPr>
+          <p:cNvCxnSpPr>
+            <a:cxnSpLocks/>
+            <a:stCxn id="7" idx="3"/>
+            <a:endCxn id="10" idx="1"/>
+          </p:cNvCxnSpPr>
+          <p:nvPr/>
+        </p:nvCxnSpPr>
+        <p:spPr>
+          <a:xfrm>
+            <a:off x="5622020" y="3923277"/>
+            <a:ext cx="2215071" cy="581109"/>
+          </a:xfrm>
+          <a:prstGeom prst="straightConnector1">
+            <a:avLst/>
+          </a:prstGeom>
+          <a:ln>
+            <a:tailEnd type="triangle"/>
+          </a:ln>
+        </p:spPr>
+        <p:style>
+          <a:lnRef idx="1">
+            <a:schemeClr val="accent1"/>
+          </a:lnRef>
+          <a:fillRef idx="0">
+            <a:schemeClr val="accent1"/>
+          </a:fillRef>
+          <a:effectRef idx="0">
+            <a:schemeClr val="accent1"/>
+          </a:effectRef>
+          <a:fontRef idx="minor">
+            <a:schemeClr val="tx1"/>
+          </a:fontRef>
+        </p:style>
+      </p:cxnSp>
+      <p:sp>
+        <p:nvSpPr>
+          <p:cNvPr id="13" name="TextBox 12">
+            <a:extLst>
+              <a:ext uri="{FF2B5EF4-FFF2-40B4-BE49-F238E27FC236}">
+                <a16:creationId xmlns:a16="http://schemas.microsoft.com/office/drawing/2014/main" id="{D35E5914-0569-422C-A277-A9CE76BB2F07}"/>
+              </a:ext>
+            </a:extLst>
+          </p:cNvPr>
+          <p:cNvSpPr txBox="1"/>
+          <p:nvPr/>
+        </p:nvSpPr>
+        <p:spPr>
+          <a:xfrm>
+            <a:off x="1132514" y="5209563"/>
+            <a:ext cx="4395831" cy="1200329"/>
           </a:xfrm>
           <a:prstGeom prst="rect">
             <a:avLst/>
@@ -3800,27 +6102,43 @@
           </a:bodyPr>
           <a:lstStyle/>
           <a:p>
-            <a:pPr marL="285750" indent="-285750">
-              <a:buFont typeface="Arial" panose="020B0604020202020204" pitchFamily="34" charset="0"/>
-              <a:buChar char="•"/>
-            </a:pPr>
-            <a:r>
-              <a:rPr lang="en-US" sz="2000" dirty="0"/>
-              <a:t>Isometric log-ratio transformation </a:t>
-            </a:r>
-          </a:p>
-          <a:p>
-            <a:pPr marL="285750" indent="-285750">
-              <a:buFont typeface="Arial" panose="020B0604020202020204" pitchFamily="34" charset="0"/>
-              <a:buChar char="•"/>
-            </a:pPr>
-            <a:r>
-              <a:rPr lang="en-US" sz="2000" dirty="0"/>
-              <a:t>Competitive Gene Set testing </a:t>
-            </a:r>
-          </a:p>
-        </p:txBody>
-      </p:sp>
+            <a:r>
+              <a:rPr lang="en-US" dirty="0"/>
+              <a:t>The ILR transformation is essentially the coordinates of a compositional vector when projected onto an orthonormal basis in the compositional space</a:t>
+            </a:r>
+          </a:p>
+        </p:txBody>
+      </p:sp>
+      <p:pic>
+        <p:nvPicPr>
+          <p:cNvPr id="14" name="Picture 13">
+            <a:extLst>
+              <a:ext uri="{FF2B5EF4-FFF2-40B4-BE49-F238E27FC236}">
+                <a16:creationId xmlns:a16="http://schemas.microsoft.com/office/drawing/2014/main" id="{8FF948CF-0D86-41A9-B532-E2E305E737A8}"/>
+              </a:ext>
+            </a:extLst>
+          </p:cNvPr>
+          <p:cNvPicPr>
+            <a:picLocks noChangeAspect="1"/>
+          </p:cNvPicPr>
+          <p:nvPr/>
+        </p:nvPicPr>
+        <p:blipFill>
+          <a:blip r:embed="rId4"/>
+          <a:stretch>
+            <a:fillRect/>
+          </a:stretch>
+        </p:blipFill>
+        <p:spPr>
+          <a:xfrm>
+            <a:off x="5605241" y="5172966"/>
+            <a:ext cx="6229350" cy="1552575"/>
+          </a:xfrm>
+          <a:prstGeom prst="rect">
+            <a:avLst/>
+          </a:prstGeom>
+        </p:spPr>
+      </p:pic>
     </p:spTree>
     <p:extLst>
       <p:ext uri="{BB962C8B-B14F-4D97-AF65-F5344CB8AC3E}">
@@ -3834,7 +6152,7 @@
 </p:sld>
 </file>
 
-<file path=ppt/slides/slide2.xml><?xml version="1.0" encoding="utf-8"?>
+<file path=ppt/slides/slide8.xml><?xml version="1.0" encoding="utf-8"?>
 <p:sld xmlns:a="http://schemas.openxmlformats.org/drawingml/2006/main" xmlns:r="http://schemas.openxmlformats.org/officeDocument/2006/relationships" xmlns:p="http://schemas.openxmlformats.org/presentationml/2006/main">
   <p:cSld>
     <p:spTree>
@@ -3851,273 +6169,94 @@
           <a:chExt cx="0" cy="0"/>
         </a:xfrm>
       </p:grpSpPr>
-      <mc:AlternateContent xmlns:mc="http://schemas.openxmlformats.org/markup-compatibility/2006">
-        <mc:Choice xmlns:a14="http://schemas.microsoft.com/office/drawing/2010/main" Requires="a14">
-          <p:sp>
-            <p:nvSpPr>
-              <p:cNvPr id="4" name="TextBox 3">
-                <a:extLst>
-                  <a:ext uri="{FF2B5EF4-FFF2-40B4-BE49-F238E27FC236}">
-                    <a16:creationId xmlns:a16="http://schemas.microsoft.com/office/drawing/2014/main" id="{CF2E4B08-A27B-441A-9BE9-971197714EED}"/>
-                  </a:ext>
-                </a:extLst>
-              </p:cNvPr>
-              <p:cNvSpPr txBox="1"/>
-              <p:nvPr/>
-            </p:nvSpPr>
-            <p:spPr>
-              <a:xfrm>
-                <a:off x="209005" y="457199"/>
-                <a:ext cx="4767943" cy="5632311"/>
-              </a:xfrm>
-              <a:prstGeom prst="rect">
-                <a:avLst/>
-              </a:prstGeom>
-              <a:noFill/>
-            </p:spPr>
-            <p:txBody>
-              <a:bodyPr wrap="square" rtlCol="0">
-                <a:spAutoFit/>
-              </a:bodyPr>
-              <a:lstStyle/>
-              <a:p>
-                <a:pPr marL="342900" indent="-342900">
-                  <a:buFont typeface="+mj-lt"/>
-                  <a:buAutoNum type="arabicPeriod"/>
-                </a:pPr>
-                <a:r>
-                  <a:rPr lang="en-US" dirty="0"/>
-                  <a:t>Simulate data using the Dirichlet-Multinomial method similar to Xiao et al. (2018) and Ma et al. (2020). </a:t>
-                </a:r>
-              </a:p>
-              <a:p>
-                <a:pPr marL="742950" lvl="1" indent="-285750">
-                  <a:buFont typeface="Arial" panose="020B0604020202020204" pitchFamily="34" charset="0"/>
-                  <a:buChar char="•"/>
-                </a:pPr>
-                <a:r>
-                  <a:rPr lang="en-US" dirty="0"/>
-                  <a:t>Use the total read counts for the top 300 taxa in HMP V35 16S data as the shape </a:t>
-                </a:r>
-                <a14:m>
-                  <m:oMath xmlns:m="http://schemas.openxmlformats.org/officeDocument/2006/math">
-                    <m:r>
-                      <a:rPr lang="en-US" b="1" i="1" smtClean="0">
-                        <a:latin typeface="Cambria Math" panose="02040503050406030204" pitchFamily="18" charset="0"/>
-                      </a:rPr>
-                      <m:t>𝜶</m:t>
-                    </m:r>
-                    <m:r>
-                      <a:rPr lang="en-US" b="1" i="1" smtClean="0">
-                        <a:latin typeface="Cambria Math" panose="02040503050406030204" pitchFamily="18" charset="0"/>
-                      </a:rPr>
-                      <m:t> </m:t>
-                    </m:r>
-                  </m:oMath>
-                </a14:m>
-                <a:r>
-                  <a:rPr lang="en-US" dirty="0"/>
-                  <a:t>parameter of a Dirichlet distribution to generate multinomial parameter </a:t>
-                </a:r>
-                <a14:m>
-                  <m:oMath xmlns:m="http://schemas.openxmlformats.org/officeDocument/2006/math">
-                    <m:r>
-                      <a:rPr lang="en-US" b="1" i="1" smtClean="0">
-                        <a:latin typeface="Cambria Math" panose="02040503050406030204" pitchFamily="18" charset="0"/>
-                      </a:rPr>
-                      <m:t>𝜽</m:t>
-                    </m:r>
-                  </m:oMath>
-                </a14:m>
-                <a:endParaRPr lang="en-US" b="1" dirty="0"/>
-              </a:p>
-              <a:p>
-                <a:pPr marL="742950" lvl="1" indent="-285750">
-                  <a:buFont typeface="Arial" panose="020B0604020202020204" pitchFamily="34" charset="0"/>
-                  <a:buChar char="•"/>
-                </a:pPr>
-                <a:r>
-                  <a:rPr lang="en-US" dirty="0"/>
-                  <a:t>Use </a:t>
-                </a:r>
-                <a14:m>
-                  <m:oMath xmlns:m="http://schemas.openxmlformats.org/officeDocument/2006/math">
-                    <m:r>
-                      <a:rPr lang="en-US" b="1" i="1" smtClean="0">
-                        <a:latin typeface="Cambria Math" panose="02040503050406030204" pitchFamily="18" charset="0"/>
-                      </a:rPr>
-                      <m:t>𝜽</m:t>
-                    </m:r>
-                  </m:oMath>
-                </a14:m>
-                <a:r>
-                  <a:rPr lang="en-US" b="1" dirty="0"/>
-                  <a:t> </a:t>
-                </a:r>
-                <a:r>
-                  <a:rPr lang="en-US" dirty="0"/>
-                  <a:t>to generate multinomial counts with total read counts per sample </a:t>
-                </a:r>
-                <a14:m>
-                  <m:oMath xmlns:m="http://schemas.openxmlformats.org/officeDocument/2006/math">
-                    <m:r>
-                      <a:rPr lang="en-US" b="0" i="1" smtClean="0">
-                        <a:latin typeface="Cambria Math" panose="02040503050406030204" pitchFamily="18" charset="0"/>
-                      </a:rPr>
-                      <m:t>~ </m:t>
-                    </m:r>
-                    <m:r>
-                      <a:rPr lang="en-US" b="0" i="1" smtClean="0">
-                        <a:latin typeface="Cambria Math" panose="02040503050406030204" pitchFamily="18" charset="0"/>
-                      </a:rPr>
-                      <m:t>𝑁𝑒𝑔𝐵𝑖𝑛</m:t>
-                    </m:r>
-                    <m:r>
-                      <a:rPr lang="en-US" b="0" i="1" smtClean="0">
-                        <a:latin typeface="Cambria Math" panose="02040503050406030204" pitchFamily="18" charset="0"/>
-                      </a:rPr>
-                      <m:t>(5000,25)</m:t>
-                    </m:r>
-                  </m:oMath>
-                </a14:m>
-                <a:endParaRPr lang="en-US" b="1" dirty="0"/>
-              </a:p>
-              <a:p>
-                <a:pPr marL="742950" lvl="1" indent="-285750">
-                  <a:buFont typeface="Arial" panose="020B0604020202020204" pitchFamily="34" charset="0"/>
-                  <a:buChar char="•"/>
-                </a:pPr>
-                <a:r>
-                  <a:rPr lang="en-US" dirty="0"/>
-                  <a:t>Random cells (with probability equivalent to 1 – degree of sparsity) will be set to 0</a:t>
-                </a:r>
-              </a:p>
-              <a:p>
-                <a:pPr marL="342900" indent="-342900">
-                  <a:buFont typeface="+mj-lt"/>
-                  <a:buAutoNum type="arabicPeriod"/>
-                </a:pPr>
-                <a:r>
-                  <a:rPr lang="en-US" dirty="0"/>
-                  <a:t>Perform sample level inflated counts similar to </a:t>
-                </a:r>
-                <a:r>
-                  <a:rPr lang="en-US" dirty="0" err="1"/>
-                  <a:t>McMurdie</a:t>
-                </a:r>
-                <a:r>
-                  <a:rPr lang="en-US" dirty="0"/>
-                  <a:t> &amp; Holmes (2013)</a:t>
-                </a:r>
-              </a:p>
-              <a:p>
-                <a:pPr marL="800100" lvl="1" indent="-342900">
-                  <a:buFont typeface="Arial" panose="020B0604020202020204" pitchFamily="34" charset="0"/>
-                  <a:buChar char="•"/>
-                </a:pPr>
-                <a:r>
-                  <a:rPr lang="en-US" dirty="0"/>
-                  <a:t>Pick 50 taxa randomly for half the samples and elevate the counts by a multiplier (effect size)</a:t>
-                </a:r>
-              </a:p>
-              <a:p>
-                <a:pPr marL="800100" lvl="1" indent="-342900">
-                  <a:buFont typeface="Arial" panose="020B0604020202020204" pitchFamily="34" charset="0"/>
-                  <a:buChar char="•"/>
-                </a:pPr>
-                <a:r>
-                  <a:rPr lang="en-US" dirty="0"/>
-                  <a:t>Evaluate type I error and power for hypothesis testing at the sample level </a:t>
-                </a:r>
-              </a:p>
-            </p:txBody>
-          </p:sp>
-        </mc:Choice>
-        <mc:Fallback>
-          <p:sp>
-            <p:nvSpPr>
-              <p:cNvPr id="4" name="TextBox 3">
-                <a:extLst>
-                  <a:ext uri="{FF2B5EF4-FFF2-40B4-BE49-F238E27FC236}">
-                    <a16:creationId xmlns:a16="http://schemas.microsoft.com/office/drawing/2014/main" id="{CF2E4B08-A27B-441A-9BE9-971197714EED}"/>
-                  </a:ext>
-                </a:extLst>
-              </p:cNvPr>
-              <p:cNvSpPr txBox="1">
-                <a:spLocks noRot="1" noChangeAspect="1" noMove="1" noResize="1" noEditPoints="1" noAdjustHandles="1" noChangeArrowheads="1" noChangeShapeType="1" noTextEdit="1"/>
-              </p:cNvSpPr>
-              <p:nvPr/>
-            </p:nvSpPr>
-            <p:spPr>
-              <a:xfrm>
-                <a:off x="209005" y="457199"/>
-                <a:ext cx="4767943" cy="5632311"/>
-              </a:xfrm>
-              <a:prstGeom prst="rect">
-                <a:avLst/>
-              </a:prstGeom>
-              <a:blipFill>
-                <a:blip r:embed="rId2"/>
-                <a:stretch>
-                  <a:fillRect l="-1023" t="-541" r="-1790" b="-758"/>
-                </a:stretch>
-              </a:blipFill>
-            </p:spPr>
-            <p:txBody>
-              <a:bodyPr/>
-              <a:lstStyle/>
-              <a:p>
-                <a:r>
-                  <a:rPr lang="en-US">
-                    <a:noFill/>
-                  </a:rPr>
-                  <a:t> </a:t>
-                </a:r>
-              </a:p>
-            </p:txBody>
-          </p:sp>
-        </mc:Fallback>
-      </mc:AlternateContent>
-      <p:pic>
-        <p:nvPicPr>
-          <p:cNvPr id="10" name="Picture 9" descr="A close up of text on a white background&#10;&#10;Description automatically generated">
-            <a:extLst>
-              <a:ext uri="{FF2B5EF4-FFF2-40B4-BE49-F238E27FC236}">
-                <a16:creationId xmlns:a16="http://schemas.microsoft.com/office/drawing/2014/main" id="{76B8F736-56EA-4238-86B6-EB7D17AA5016}"/>
-              </a:ext>
-            </a:extLst>
-          </p:cNvPr>
-          <p:cNvPicPr>
-            <a:picLocks noChangeAspect="1"/>
-          </p:cNvPicPr>
-          <p:nvPr/>
-        </p:nvPicPr>
-        <p:blipFill>
-          <a:blip r:embed="rId3">
-            <a:extLst>
-              <a:ext uri="{28A0092B-C50C-407E-A947-70E740481C1C}">
-                <a14:useLocalDpi xmlns:a14="http://schemas.microsoft.com/office/drawing/2010/main" val="0"/>
-              </a:ext>
-            </a:extLst>
-          </a:blip>
-          <a:stretch>
-            <a:fillRect/>
-          </a:stretch>
-        </p:blipFill>
+      <p:sp>
+        <p:nvSpPr>
+          <p:cNvPr id="2" name="Title 1">
+            <a:extLst>
+              <a:ext uri="{FF2B5EF4-FFF2-40B4-BE49-F238E27FC236}">
+                <a16:creationId xmlns:a16="http://schemas.microsoft.com/office/drawing/2014/main" id="{7830A764-57AC-4636-BE0A-9CEA2D1941A3}"/>
+              </a:ext>
+            </a:extLst>
+          </p:cNvPr>
+          <p:cNvSpPr>
+            <a:spLocks noGrp="1"/>
+          </p:cNvSpPr>
+          <p:nvPr>
+            <p:ph type="title"/>
+          </p:nvPr>
+        </p:nvSpPr>
+        <p:spPr/>
+        <p:txBody>
+          <a:bodyPr/>
+          <a:lstStyle/>
+          <a:p>
+            <a:r>
+              <a:rPr lang="en-US" dirty="0"/>
+              <a:t>Next steps</a:t>
+            </a:r>
+          </a:p>
+        </p:txBody>
+      </p:sp>
+      <p:sp>
+        <p:nvSpPr>
+          <p:cNvPr id="3" name="Content Placeholder 2">
+            <a:extLst>
+              <a:ext uri="{FF2B5EF4-FFF2-40B4-BE49-F238E27FC236}">
+                <a16:creationId xmlns:a16="http://schemas.microsoft.com/office/drawing/2014/main" id="{F148E6B8-0A85-48C0-A246-2F19549EF0FD}"/>
+              </a:ext>
+            </a:extLst>
+          </p:cNvPr>
+          <p:cNvSpPr>
+            <a:spLocks noGrp="1"/>
+          </p:cNvSpPr>
+          <p:nvPr>
+            <p:ph idx="1"/>
+          </p:nvPr>
+        </p:nvSpPr>
         <p:spPr>
           <a:xfrm>
-            <a:off x="4976949" y="91440"/>
-            <a:ext cx="7314408" cy="6458824"/>
+            <a:off x="838200" y="1825625"/>
+            <a:ext cx="10515600" cy="1766661"/>
           </a:xfrm>
-          <a:prstGeom prst="rect">
-            <a:avLst/>
-          </a:prstGeom>
         </p:spPr>
-      </p:pic>
+        <p:txBody>
+          <a:bodyPr>
+            <a:normAutofit fontScale="92500" lnSpcReduction="10000"/>
+          </a:bodyPr>
+          <a:lstStyle/>
+          <a:p>
+            <a:r>
+              <a:rPr lang="en-US" dirty="0"/>
+              <a:t>Re-do the implementation that is more stable </a:t>
+            </a:r>
+          </a:p>
+          <a:p>
+            <a:r>
+              <a:rPr lang="en-US" dirty="0"/>
+              <a:t>Simulate differential abundance analysis </a:t>
+            </a:r>
+          </a:p>
+          <a:p>
+            <a:r>
+              <a:rPr lang="en-US" dirty="0"/>
+              <a:t>Investigate issues with sparsity </a:t>
+            </a:r>
+          </a:p>
+          <a:p>
+            <a:r>
+              <a:rPr lang="en-US" dirty="0"/>
+              <a:t>Define statistical properties of the statistic and write-up that section</a:t>
+            </a:r>
+          </a:p>
+          <a:p>
+            <a:endParaRPr lang="en-US" dirty="0"/>
+          </a:p>
+        </p:txBody>
+      </p:sp>
     </p:spTree>
     <p:extLst>
       <p:ext uri="{BB962C8B-B14F-4D97-AF65-F5344CB8AC3E}">
-        <p14:creationId xmlns:p14="http://schemas.microsoft.com/office/powerpoint/2010/main" val="2329251424"/>
+        <p14:creationId xmlns:p14="http://schemas.microsoft.com/office/powerpoint/2010/main" val="3662524637"/>
       </p:ext>
     </p:extLst>
   </p:cSld>
@@ -4127,7 +6266,7 @@
 </p:sld>
 </file>
 
-<file path=ppt/slides/slide3.xml><?xml version="1.0" encoding="utf-8"?>
+<file path=ppt/slides/slide9.xml><?xml version="1.0" encoding="utf-8"?>
 <p:sld xmlns:a="http://schemas.openxmlformats.org/drawingml/2006/main" xmlns:r="http://schemas.openxmlformats.org/officeDocument/2006/relationships" xmlns:p="http://schemas.openxmlformats.org/presentationml/2006/main">
   <p:cSld>
     <p:spTree>
@@ -4144,188 +6283,126 @@
           <a:chExt cx="0" cy="0"/>
         </a:xfrm>
       </p:grpSpPr>
-      <mc:AlternateContent xmlns:mc="http://schemas.openxmlformats.org/markup-compatibility/2006">
-        <mc:Choice xmlns:a14="http://schemas.microsoft.com/office/drawing/2010/main" Requires="a14">
-          <p:sp>
-            <p:nvSpPr>
-              <p:cNvPr id="6" name="TextBox 5">
-                <a:extLst>
-                  <a:ext uri="{FF2B5EF4-FFF2-40B4-BE49-F238E27FC236}">
-                    <a16:creationId xmlns:a16="http://schemas.microsoft.com/office/drawing/2014/main" id="{4C84F08D-E2F1-42B9-9D61-09B2E6563994}"/>
-                  </a:ext>
-                </a:extLst>
-              </p:cNvPr>
-              <p:cNvSpPr txBox="1"/>
-              <p:nvPr/>
-            </p:nvSpPr>
-            <p:spPr>
-              <a:xfrm>
-                <a:off x="333423" y="604779"/>
-                <a:ext cx="3487783" cy="5909310"/>
-              </a:xfrm>
-              <a:prstGeom prst="rect">
-                <a:avLst/>
-              </a:prstGeom>
-              <a:noFill/>
-            </p:spPr>
-            <p:txBody>
-              <a:bodyPr wrap="square" rtlCol="0">
-                <a:spAutoFit/>
-              </a:bodyPr>
-              <a:lstStyle/>
-              <a:p>
-                <a:pPr marL="285750" indent="-285750">
-                  <a:buFont typeface="Arial" panose="020B0604020202020204" pitchFamily="34" charset="0"/>
-                  <a:buChar char="•"/>
-                </a:pPr>
-                <a:r>
-                  <a:rPr lang="en-US" dirty="0"/>
-                  <a:t>10 data sets each simulation condition with 200 samples each</a:t>
-                </a:r>
-              </a:p>
-              <a:p>
-                <a:pPr marL="285750" indent="-285750">
-                  <a:buFont typeface="Arial" panose="020B0604020202020204" pitchFamily="34" charset="0"/>
-                  <a:buChar char="•"/>
-                </a:pPr>
-                <a:r>
-                  <a:rPr lang="en-US" dirty="0"/>
-                  <a:t>Since the null distribution is standard normal, I used </a:t>
-                </a:r>
-                <a14:m>
-                  <m:oMath xmlns:m="http://schemas.openxmlformats.org/officeDocument/2006/math">
-                    <m:r>
-                      <a:rPr lang="en-US" b="0" i="1" smtClean="0">
-                        <a:latin typeface="Cambria Math" panose="02040503050406030204" pitchFamily="18" charset="0"/>
-                      </a:rPr>
-                      <m:t>±1.96</m:t>
-                    </m:r>
-                  </m:oMath>
-                </a14:m>
-                <a:r>
-                  <a:rPr lang="en-US" dirty="0"/>
-                  <a:t> as the cutoff for significantly enriched (in one direction or the other) to control for type 1 error at 0.05</a:t>
-                </a:r>
-              </a:p>
-              <a:p>
-                <a:pPr marL="285750" indent="-285750">
-                  <a:buFont typeface="Arial" panose="020B0604020202020204" pitchFamily="34" charset="0"/>
-                  <a:buChar char="•"/>
-                </a:pPr>
-                <a:r>
-                  <a:rPr lang="en-US" dirty="0"/>
-                  <a:t>For AUC calculations, I used absolute values</a:t>
-                </a:r>
-              </a:p>
-              <a:p>
-                <a:pPr marL="285750" indent="-285750">
-                  <a:buFont typeface="Arial" panose="020B0604020202020204" pitchFamily="34" charset="0"/>
-                  <a:buChar char="•"/>
-                </a:pPr>
-                <a:r>
-                  <a:rPr lang="en-US" dirty="0"/>
-                  <a:t>Resampling produced very weird estimates </a:t>
-                </a:r>
-              </a:p>
-              <a:p>
-                <a:pPr marL="742950" lvl="1" indent="-285750">
-                  <a:buFont typeface="Arial" panose="020B0604020202020204" pitchFamily="34" charset="0"/>
-                  <a:buChar char="•"/>
-                </a:pPr>
-                <a:r>
-                  <a:rPr lang="en-US" dirty="0"/>
-                  <a:t>Perform resampling </a:t>
-                </a:r>
-              </a:p>
-              <a:p>
-                <a:pPr marL="742950" lvl="1" indent="-285750">
-                  <a:buFont typeface="Arial" panose="020B0604020202020204" pitchFamily="34" charset="0"/>
-                  <a:buChar char="•"/>
-                </a:pPr>
-                <a:r>
-                  <a:rPr lang="en-US" dirty="0"/>
-                  <a:t>Fit a normal distribution to the resampled statistic</a:t>
-                </a:r>
-              </a:p>
-              <a:p>
-                <a:pPr marL="742950" lvl="1" indent="-285750">
-                  <a:buFont typeface="Arial" panose="020B0604020202020204" pitchFamily="34" charset="0"/>
-                  <a:buChar char="•"/>
-                </a:pPr>
-                <a:r>
-                  <a:rPr lang="en-US" dirty="0"/>
-                  <a:t>New z score = (raw ILR score – mean of the resampled null)/ </a:t>
-                </a:r>
-                <a:r>
-                  <a:rPr lang="en-US" dirty="0" err="1"/>
-                  <a:t>sd</a:t>
-                </a:r>
-                <a:r>
-                  <a:rPr lang="en-US" dirty="0"/>
-                  <a:t> of the resampled null</a:t>
-                </a:r>
-              </a:p>
-              <a:p>
-                <a:pPr marL="285750" indent="-285750">
-                  <a:buFont typeface="Arial" panose="020B0604020202020204" pitchFamily="34" charset="0"/>
-                  <a:buChar char="•"/>
-                </a:pPr>
-                <a:endParaRPr lang="en-US" dirty="0"/>
-              </a:p>
-            </p:txBody>
-          </p:sp>
-        </mc:Choice>
-        <mc:Fallback>
-          <p:sp>
-            <p:nvSpPr>
-              <p:cNvPr id="6" name="TextBox 5">
-                <a:extLst>
-                  <a:ext uri="{FF2B5EF4-FFF2-40B4-BE49-F238E27FC236}">
-                    <a16:creationId xmlns:a16="http://schemas.microsoft.com/office/drawing/2014/main" id="{4C84F08D-E2F1-42B9-9D61-09B2E6563994}"/>
-                  </a:ext>
-                </a:extLst>
-              </p:cNvPr>
-              <p:cNvSpPr txBox="1">
-                <a:spLocks noRot="1" noChangeAspect="1" noMove="1" noResize="1" noEditPoints="1" noAdjustHandles="1" noChangeArrowheads="1" noChangeShapeType="1" noTextEdit="1"/>
-              </p:cNvSpPr>
-              <p:nvPr/>
-            </p:nvSpPr>
-            <p:spPr>
-              <a:xfrm>
-                <a:off x="333423" y="604779"/>
-                <a:ext cx="3487783" cy="5909310"/>
-              </a:xfrm>
-              <a:prstGeom prst="rect">
-                <a:avLst/>
-              </a:prstGeom>
-              <a:blipFill>
-                <a:blip r:embed="rId2"/>
-                <a:stretch>
-                  <a:fillRect l="-1224" t="-515" r="-874"/>
-                </a:stretch>
-              </a:blipFill>
-            </p:spPr>
-            <p:txBody>
-              <a:bodyPr/>
-              <a:lstStyle/>
-              <a:p>
-                <a:r>
-                  <a:rPr lang="en-US">
-                    <a:noFill/>
-                  </a:rPr>
-                  <a:t> </a:t>
-                </a:r>
-              </a:p>
-            </p:txBody>
-          </p:sp>
-        </mc:Fallback>
-      </mc:AlternateContent>
+      <p:sp>
+        <p:nvSpPr>
+          <p:cNvPr id="4" name="TextBox 3">
+            <a:extLst>
+              <a:ext uri="{FF2B5EF4-FFF2-40B4-BE49-F238E27FC236}">
+                <a16:creationId xmlns:a16="http://schemas.microsoft.com/office/drawing/2014/main" id="{CF2E4B08-A27B-441A-9BE9-971197714EED}"/>
+              </a:ext>
+            </a:extLst>
+          </p:cNvPr>
+          <p:cNvSpPr txBox="1"/>
+          <p:nvPr/>
+        </p:nvSpPr>
+        <p:spPr>
+          <a:xfrm>
+            <a:off x="401952" y="1478453"/>
+            <a:ext cx="4932048" cy="4324261"/>
+          </a:xfrm>
+          <a:prstGeom prst="rect">
+            <a:avLst/>
+          </a:prstGeom>
+          <a:noFill/>
+        </p:spPr>
+        <p:txBody>
+          <a:bodyPr wrap="square" rtlCol="0">
+            <a:spAutoFit/>
+          </a:bodyPr>
+          <a:lstStyle/>
+          <a:p>
+            <a:pPr marL="285750" indent="-285750">
+              <a:buFont typeface="Arial" panose="020B0604020202020204" pitchFamily="34" charset="0"/>
+              <a:buChar char="•"/>
+            </a:pPr>
+            <a:r>
+              <a:rPr lang="en-US" sz="2500" dirty="0"/>
+              <a:t>Generating zero-inflated negative binomial data from normal-copula functions. Parameters of zero-inflated marginals drawn from fitting the distribution to each OTU in the HMP 16S data set. Effect size is calculated as a multiplier to the mean of the distribution</a:t>
+            </a:r>
+          </a:p>
+          <a:p>
+            <a:pPr marL="742950" lvl="1" indent="-285750">
+              <a:buFont typeface="Arial" panose="020B0604020202020204" pitchFamily="34" charset="0"/>
+              <a:buChar char="•"/>
+            </a:pPr>
+            <a:r>
+              <a:rPr lang="en-US" sz="2500" dirty="0"/>
+              <a:t>Flexible correlation </a:t>
+            </a:r>
+          </a:p>
+          <a:p>
+            <a:pPr marL="742950" lvl="1" indent="-285750">
+              <a:buFont typeface="Arial" panose="020B0604020202020204" pitchFamily="34" charset="0"/>
+              <a:buChar char="•"/>
+            </a:pPr>
+            <a:r>
+              <a:rPr lang="en-US" sz="2500" dirty="0"/>
+              <a:t>Flexible zero-inflation </a:t>
+            </a:r>
+          </a:p>
+        </p:txBody>
+      </p:sp>
+      <p:sp>
+        <p:nvSpPr>
+          <p:cNvPr id="7" name="Title 1">
+            <a:extLst>
+              <a:ext uri="{FF2B5EF4-FFF2-40B4-BE49-F238E27FC236}">
+                <a16:creationId xmlns:a16="http://schemas.microsoft.com/office/drawing/2014/main" id="{D4E4775B-5CEB-4126-B208-804A55720058}"/>
+              </a:ext>
+            </a:extLst>
+          </p:cNvPr>
+          <p:cNvSpPr txBox="1">
+            <a:spLocks/>
+          </p:cNvSpPr>
+          <p:nvPr/>
+        </p:nvSpPr>
+        <p:spPr>
+          <a:xfrm>
+            <a:off x="401952" y="553673"/>
+            <a:ext cx="4317830" cy="757892"/>
+          </a:xfrm>
+          <a:prstGeom prst="rect">
+            <a:avLst/>
+          </a:prstGeom>
+        </p:spPr>
+        <p:txBody>
+          <a:bodyPr vert="horz" lIns="91440" tIns="45720" rIns="91440" bIns="45720" rtlCol="0" anchor="b">
+            <a:normAutofit/>
+          </a:bodyPr>
+          <a:lstStyle>
+            <a:lvl1pPr algn="ctr" defTabSz="914400" rtl="0" eaLnBrk="1" latinLnBrk="0" hangingPunct="1">
+              <a:lnSpc>
+                <a:spcPct val="90000"/>
+              </a:lnSpc>
+              <a:spcBef>
+                <a:spcPct val="0"/>
+              </a:spcBef>
+              <a:buNone/>
+              <a:defRPr sz="6000" kern="1200">
+                <a:solidFill>
+                  <a:schemeClr val="tx1"/>
+                </a:solidFill>
+                <a:latin typeface="+mj-lt"/>
+                <a:ea typeface="+mj-ea"/>
+                <a:cs typeface="+mj-cs"/>
+              </a:defRPr>
+            </a:lvl1pPr>
+          </a:lstStyle>
+          <a:p>
+            <a:pPr algn="l"/>
+            <a:r>
+              <a:rPr lang="en-US" sz="4000" dirty="0"/>
+              <a:t>Simulation Design</a:t>
+            </a:r>
+          </a:p>
+        </p:txBody>
+      </p:sp>
       <p:pic>
         <p:nvPicPr>
-          <p:cNvPr id="8" name="Picture 7" descr="A close up of a map&#10;&#10;Description automatically generated">
-            <a:extLst>
-              <a:ext uri="{FF2B5EF4-FFF2-40B4-BE49-F238E27FC236}">
-                <a16:creationId xmlns:a16="http://schemas.microsoft.com/office/drawing/2014/main" id="{12057D86-1981-4944-870D-CC687AEF63AA}"/>
+          <p:cNvPr id="9" name="Picture 8" descr="Chart, bar chart&#10;&#10;Description automatically generated">
+            <a:extLst>
+              <a:ext uri="{FF2B5EF4-FFF2-40B4-BE49-F238E27FC236}">
+                <a16:creationId xmlns:a16="http://schemas.microsoft.com/office/drawing/2014/main" id="{ED34E1B3-2314-433F-8C1B-C01A5A1FF86C}"/>
               </a:ext>
             </a:extLst>
           </p:cNvPr>
@@ -4335,7 +6412,7 @@
           <p:nvPr/>
         </p:nvPicPr>
         <p:blipFill>
-          <a:blip r:embed="rId3">
+          <a:blip r:embed="rId2">
             <a:extLst>
               <a:ext uri="{28A0092B-C50C-407E-A947-70E740481C1C}">
                 <a14:useLocalDpi xmlns:a14="http://schemas.microsoft.com/office/drawing/2010/main" val="0"/>
@@ -4348,8 +6425,8 @@
         </p:blipFill>
         <p:spPr>
           <a:xfrm>
-            <a:off x="3962401" y="-1"/>
-            <a:ext cx="8229599" cy="6858000"/>
+            <a:off x="5334000" y="0"/>
+            <a:ext cx="6858000" cy="6858000"/>
           </a:xfrm>
           <a:prstGeom prst="rect">
             <a:avLst/>
@@ -4359,121 +6436,7 @@
     </p:spTree>
     <p:extLst>
       <p:ext uri="{BB962C8B-B14F-4D97-AF65-F5344CB8AC3E}">
-        <p14:creationId xmlns:p14="http://schemas.microsoft.com/office/powerpoint/2010/main" val="3831782823"/>
-      </p:ext>
-    </p:extLst>
-  </p:cSld>
-  <p:clrMapOvr>
-    <a:masterClrMapping/>
-  </p:clrMapOvr>
-</p:sld>
-</file>
-
-<file path=ppt/slides/slide4.xml><?xml version="1.0" encoding="utf-8"?>
-<p:sld xmlns:a="http://schemas.openxmlformats.org/drawingml/2006/main" xmlns:r="http://schemas.openxmlformats.org/officeDocument/2006/relationships" xmlns:p="http://schemas.openxmlformats.org/presentationml/2006/main">
-  <p:cSld>
-    <p:spTree>
-      <p:nvGrpSpPr>
-        <p:cNvPr id="1" name=""/>
-        <p:cNvGrpSpPr/>
-        <p:nvPr/>
-      </p:nvGrpSpPr>
-      <p:grpSpPr>
-        <a:xfrm>
-          <a:off x="0" y="0"/>
-          <a:ext cx="0" cy="0"/>
-          <a:chOff x="0" y="0"/>
-          <a:chExt cx="0" cy="0"/>
-        </a:xfrm>
-      </p:grpSpPr>
-      <p:sp>
-        <p:nvSpPr>
-          <p:cNvPr id="2" name="Title 1">
-            <a:extLst>
-              <a:ext uri="{FF2B5EF4-FFF2-40B4-BE49-F238E27FC236}">
-                <a16:creationId xmlns:a16="http://schemas.microsoft.com/office/drawing/2014/main" id="{7830A764-57AC-4636-BE0A-9CEA2D1941A3}"/>
-              </a:ext>
-            </a:extLst>
-          </p:cNvPr>
-          <p:cNvSpPr>
-            <a:spLocks noGrp="1"/>
-          </p:cNvSpPr>
-          <p:nvPr>
-            <p:ph type="title"/>
-          </p:nvPr>
-        </p:nvSpPr>
-        <p:spPr/>
-        <p:txBody>
-          <a:bodyPr/>
-          <a:lstStyle/>
-          <a:p>
-            <a:r>
-              <a:rPr lang="en-US" dirty="0"/>
-              <a:t>Next steps</a:t>
-            </a:r>
-          </a:p>
-        </p:txBody>
-      </p:sp>
-      <p:sp>
-        <p:nvSpPr>
-          <p:cNvPr id="3" name="Content Placeholder 2">
-            <a:extLst>
-              <a:ext uri="{FF2B5EF4-FFF2-40B4-BE49-F238E27FC236}">
-                <a16:creationId xmlns:a16="http://schemas.microsoft.com/office/drawing/2014/main" id="{F148E6B8-0A85-48C0-A246-2F19549EF0FD}"/>
-              </a:ext>
-            </a:extLst>
-          </p:cNvPr>
-          <p:cNvSpPr>
-            <a:spLocks noGrp="1"/>
-          </p:cNvSpPr>
-          <p:nvPr>
-            <p:ph idx="1"/>
-          </p:nvPr>
-        </p:nvSpPr>
-        <p:spPr>
-          <a:xfrm>
-            <a:off x="838200" y="1825625"/>
-            <a:ext cx="10515600" cy="1766661"/>
-          </a:xfrm>
-        </p:spPr>
-        <p:txBody>
-          <a:bodyPr>
-            <a:normAutofit fontScale="92500" lnSpcReduction="10000"/>
-          </a:bodyPr>
-          <a:lstStyle/>
-          <a:p>
-            <a:r>
-              <a:rPr lang="en-US" dirty="0"/>
-              <a:t>Re-do the implementation that is more stable </a:t>
-            </a:r>
-          </a:p>
-          <a:p>
-            <a:r>
-              <a:rPr lang="en-US" dirty="0"/>
-              <a:t>Simulate differential abundance analysis </a:t>
-            </a:r>
-          </a:p>
-          <a:p>
-            <a:r>
-              <a:rPr lang="en-US" dirty="0"/>
-              <a:t>Investigate issues with sparsity </a:t>
-            </a:r>
-          </a:p>
-          <a:p>
-            <a:r>
-              <a:rPr lang="en-US" dirty="0"/>
-              <a:t>Define statistical properties of the statistic and write-up that section</a:t>
-            </a:r>
-          </a:p>
-          <a:p>
-            <a:endParaRPr lang="en-US" dirty="0"/>
-          </a:p>
-        </p:txBody>
-      </p:sp>
-    </p:spTree>
-    <p:extLst>
-      <p:ext uri="{BB962C8B-B14F-4D97-AF65-F5344CB8AC3E}">
-        <p14:creationId xmlns:p14="http://schemas.microsoft.com/office/powerpoint/2010/main" val="3662524637"/>
+        <p14:creationId xmlns:p14="http://schemas.microsoft.com/office/powerpoint/2010/main" val="459208083"/>
       </p:ext>
     </p:extLst>
   </p:cSld>

</xml_diff>

<commit_message>
New files to be created
</commit_message>
<xml_diff>
--- a/docs/progress_report.pptx
+++ b/docs/progress_report.pptx
@@ -12,10 +12,10 @@
     <p:sldId id="269" r:id="rId6"/>
     <p:sldId id="270" r:id="rId7"/>
     <p:sldId id="259" r:id="rId8"/>
-    <p:sldId id="258" r:id="rId9"/>
-    <p:sldId id="260" r:id="rId10"/>
-    <p:sldId id="264" r:id="rId11"/>
-    <p:sldId id="271" r:id="rId12"/>
+    <p:sldId id="260" r:id="rId9"/>
+    <p:sldId id="264" r:id="rId10"/>
+    <p:sldId id="271" r:id="rId11"/>
+    <p:sldId id="274" r:id="rId12"/>
     <p:sldId id="273" r:id="rId13"/>
     <p:sldId id="272" r:id="rId14"/>
     <p:sldId id="263" r:id="rId15"/>
@@ -274,7 +274,7 @@
           <a:p>
             <a:fld id="{C985B2CD-F43A-460A-B9AE-E70946351B0A}" type="datetimeFigureOut">
               <a:rPr lang="en-US" smtClean="0"/>
-              <a:t>9/29/2020</a:t>
+              <a:t>9/30/2020</a:t>
             </a:fld>
             <a:endParaRPr lang="en-US"/>
           </a:p>
@@ -472,7 +472,7 @@
           <a:p>
             <a:fld id="{C985B2CD-F43A-460A-B9AE-E70946351B0A}" type="datetimeFigureOut">
               <a:rPr lang="en-US" smtClean="0"/>
-              <a:t>9/29/2020</a:t>
+              <a:t>9/30/2020</a:t>
             </a:fld>
             <a:endParaRPr lang="en-US"/>
           </a:p>
@@ -680,7 +680,7 @@
           <a:p>
             <a:fld id="{C985B2CD-F43A-460A-B9AE-E70946351B0A}" type="datetimeFigureOut">
               <a:rPr lang="en-US" smtClean="0"/>
-              <a:t>9/29/2020</a:t>
+              <a:t>9/30/2020</a:t>
             </a:fld>
             <a:endParaRPr lang="en-US"/>
           </a:p>
@@ -878,7 +878,7 @@
           <a:p>
             <a:fld id="{C985B2CD-F43A-460A-B9AE-E70946351B0A}" type="datetimeFigureOut">
               <a:rPr lang="en-US" smtClean="0"/>
-              <a:t>9/29/2020</a:t>
+              <a:t>9/30/2020</a:t>
             </a:fld>
             <a:endParaRPr lang="en-US"/>
           </a:p>
@@ -1153,7 +1153,7 @@
           <a:p>
             <a:fld id="{C985B2CD-F43A-460A-B9AE-E70946351B0A}" type="datetimeFigureOut">
               <a:rPr lang="en-US" smtClean="0"/>
-              <a:t>9/29/2020</a:t>
+              <a:t>9/30/2020</a:t>
             </a:fld>
             <a:endParaRPr lang="en-US"/>
           </a:p>
@@ -1418,7 +1418,7 @@
           <a:p>
             <a:fld id="{C985B2CD-F43A-460A-B9AE-E70946351B0A}" type="datetimeFigureOut">
               <a:rPr lang="en-US" smtClean="0"/>
-              <a:t>9/29/2020</a:t>
+              <a:t>9/30/2020</a:t>
             </a:fld>
             <a:endParaRPr lang="en-US"/>
           </a:p>
@@ -1830,7 +1830,7 @@
           <a:p>
             <a:fld id="{C985B2CD-F43A-460A-B9AE-E70946351B0A}" type="datetimeFigureOut">
               <a:rPr lang="en-US" smtClean="0"/>
-              <a:t>9/29/2020</a:t>
+              <a:t>9/30/2020</a:t>
             </a:fld>
             <a:endParaRPr lang="en-US"/>
           </a:p>
@@ -1971,7 +1971,7 @@
           <a:p>
             <a:fld id="{C985B2CD-F43A-460A-B9AE-E70946351B0A}" type="datetimeFigureOut">
               <a:rPr lang="en-US" smtClean="0"/>
-              <a:t>9/29/2020</a:t>
+              <a:t>9/30/2020</a:t>
             </a:fld>
             <a:endParaRPr lang="en-US"/>
           </a:p>
@@ -2084,7 +2084,7 @@
           <a:p>
             <a:fld id="{C985B2CD-F43A-460A-B9AE-E70946351B0A}" type="datetimeFigureOut">
               <a:rPr lang="en-US" smtClean="0"/>
-              <a:t>9/29/2020</a:t>
+              <a:t>9/30/2020</a:t>
             </a:fld>
             <a:endParaRPr lang="en-US"/>
           </a:p>
@@ -2395,7 +2395,7 @@
           <a:p>
             <a:fld id="{C985B2CD-F43A-460A-B9AE-E70946351B0A}" type="datetimeFigureOut">
               <a:rPr lang="en-US" smtClean="0"/>
-              <a:t>9/29/2020</a:t>
+              <a:t>9/30/2020</a:t>
             </a:fld>
             <a:endParaRPr lang="en-US"/>
           </a:p>
@@ -2683,7 +2683,7 @@
           <a:p>
             <a:fld id="{C985B2CD-F43A-460A-B9AE-E70946351B0A}" type="datetimeFigureOut">
               <a:rPr lang="en-US" smtClean="0"/>
-              <a:t>9/29/2020</a:t>
+              <a:t>9/30/2020</a:t>
             </a:fld>
             <a:endParaRPr lang="en-US"/>
           </a:p>
@@ -2924,7 +2924,7 @@
           <a:p>
             <a:fld id="{C985B2CD-F43A-460A-B9AE-E70946351B0A}" type="datetimeFigureOut">
               <a:rPr lang="en-US" smtClean="0"/>
-              <a:t>9/29/2020</a:t>
+              <a:t>9/30/2020</a:t>
             </a:fld>
             <a:endParaRPr lang="en-US"/>
           </a:p>
@@ -3434,12 +3434,47 @@
           <a:chExt cx="0" cy="0"/>
         </a:xfrm>
       </p:grpSpPr>
+      <p:sp>
+        <p:nvSpPr>
+          <p:cNvPr id="4" name="TextBox 3">
+            <a:extLst>
+              <a:ext uri="{FF2B5EF4-FFF2-40B4-BE49-F238E27FC236}">
+                <a16:creationId xmlns:a16="http://schemas.microsoft.com/office/drawing/2014/main" id="{CF2E4B08-A27B-441A-9BE9-971197714EED}"/>
+              </a:ext>
+            </a:extLst>
+          </p:cNvPr>
+          <p:cNvSpPr txBox="1"/>
+          <p:nvPr/>
+        </p:nvSpPr>
+        <p:spPr>
+          <a:xfrm>
+            <a:off x="72409" y="144412"/>
+            <a:ext cx="12359736" cy="553998"/>
+          </a:xfrm>
+          <a:prstGeom prst="rect">
+            <a:avLst/>
+          </a:prstGeom>
+          <a:noFill/>
+        </p:spPr>
+        <p:txBody>
+          <a:bodyPr wrap="square" rtlCol="0">
+            <a:spAutoFit/>
+          </a:bodyPr>
+          <a:lstStyle/>
+          <a:p>
+            <a:r>
+              <a:rPr lang="en-US" sz="3000" dirty="0"/>
+              <a:t>Hypothesis-testing at the single sample level</a:t>
+            </a:r>
+          </a:p>
+        </p:txBody>
+      </p:sp>
       <p:pic>
         <p:nvPicPr>
-          <p:cNvPr id="3" name="Picture 2" descr="Chart, line chart&#10;&#10;Description automatically generated">
-            <a:extLst>
-              <a:ext uri="{FF2B5EF4-FFF2-40B4-BE49-F238E27FC236}">
-                <a16:creationId xmlns:a16="http://schemas.microsoft.com/office/drawing/2014/main" id="{DB5067B4-3E5A-424B-90FC-370EE3E4B7E8}"/>
+          <p:cNvPr id="3" name="Picture 2" descr="Chart&#10;&#10;Description automatically generated">
+            <a:extLst>
+              <a:ext uri="{FF2B5EF4-FFF2-40B4-BE49-F238E27FC236}">
+                <a16:creationId xmlns:a16="http://schemas.microsoft.com/office/drawing/2014/main" id="{6FBB2C1B-53CF-4E16-B066-F983521F0E0A}"/>
               </a:ext>
             </a:extLst>
           </p:cNvPr>
@@ -3462,18 +3497,77 @@
         </p:blipFill>
         <p:spPr>
           <a:xfrm>
-            <a:off x="341734" y="228593"/>
-            <a:ext cx="10972822" cy="6400813"/>
+            <a:off x="5943600" y="698410"/>
+            <a:ext cx="6248400" cy="6248400"/>
           </a:xfrm>
           <a:prstGeom prst="rect">
             <a:avLst/>
           </a:prstGeom>
         </p:spPr>
       </p:pic>
+      <p:sp>
+        <p:nvSpPr>
+          <p:cNvPr id="2" name="TextBox 1">
+            <a:extLst>
+              <a:ext uri="{FF2B5EF4-FFF2-40B4-BE49-F238E27FC236}">
+                <a16:creationId xmlns:a16="http://schemas.microsoft.com/office/drawing/2014/main" id="{E4D4E22A-1660-442B-9BC6-0EAC43C11421}"/>
+              </a:ext>
+            </a:extLst>
+          </p:cNvPr>
+          <p:cNvSpPr txBox="1"/>
+          <p:nvPr/>
+        </p:nvSpPr>
+        <p:spPr>
+          <a:xfrm>
+            <a:off x="293615" y="2228671"/>
+            <a:ext cx="4639112" cy="1754326"/>
+          </a:xfrm>
+          <a:prstGeom prst="rect">
+            <a:avLst/>
+          </a:prstGeom>
+          <a:noFill/>
+        </p:spPr>
+        <p:txBody>
+          <a:bodyPr wrap="square" rtlCol="0">
+            <a:spAutoFit/>
+          </a:bodyPr>
+          <a:lstStyle/>
+          <a:p>
+            <a:pPr marL="285750" indent="-285750">
+              <a:buFont typeface="Arial" panose="020B0604020202020204" pitchFamily="34" charset="0"/>
+              <a:buChar char="•"/>
+            </a:pPr>
+            <a:r>
+              <a:rPr lang="en-US" dirty="0"/>
+              <a:t>Type I error rate</a:t>
+            </a:r>
+          </a:p>
+          <a:p>
+            <a:pPr marL="285750" indent="-285750">
+              <a:buFont typeface="Arial" panose="020B0604020202020204" pitchFamily="34" charset="0"/>
+              <a:buChar char="•"/>
+            </a:pPr>
+            <a:r>
+              <a:rPr lang="en-US" dirty="0"/>
+              <a:t>Generated a null data set of varying sparsity and inter-taxa correlation with 10,000 samples.</a:t>
+            </a:r>
+          </a:p>
+          <a:p>
+            <a:pPr marL="285750" indent="-285750">
+              <a:buFont typeface="Arial" panose="020B0604020202020204" pitchFamily="34" charset="0"/>
+              <a:buChar char="•"/>
+            </a:pPr>
+            <a:r>
+              <a:rPr lang="en-US" dirty="0"/>
+              <a:t>Assign random variables into a set (no differential abundance) of varying sizes</a:t>
+            </a:r>
+          </a:p>
+        </p:txBody>
+      </p:sp>
     </p:spTree>
     <p:extLst>
       <p:ext uri="{BB962C8B-B14F-4D97-AF65-F5344CB8AC3E}">
-        <p14:creationId xmlns:p14="http://schemas.microsoft.com/office/powerpoint/2010/main" val="2318282007"/>
+        <p14:creationId xmlns:p14="http://schemas.microsoft.com/office/powerpoint/2010/main" val="3748886881"/>
       </p:ext>
     </p:extLst>
   </p:cSld>
@@ -3537,10 +3631,10 @@
       </p:sp>
       <p:pic>
         <p:nvPicPr>
-          <p:cNvPr id="3" name="Picture 2" descr="Chart&#10;&#10;Description automatically generated">
-            <a:extLst>
-              <a:ext uri="{FF2B5EF4-FFF2-40B4-BE49-F238E27FC236}">
-                <a16:creationId xmlns:a16="http://schemas.microsoft.com/office/drawing/2014/main" id="{6FBB2C1B-53CF-4E16-B066-F983521F0E0A}"/>
+          <p:cNvPr id="9" name="Picture 8" descr="Graphical user interface, chart&#10;&#10;Description automatically generated">
+            <a:extLst>
+              <a:ext uri="{FF2B5EF4-FFF2-40B4-BE49-F238E27FC236}">
+                <a16:creationId xmlns:a16="http://schemas.microsoft.com/office/drawing/2014/main" id="{991AB92C-9B35-48DA-8737-1933C7CC3C86}"/>
               </a:ext>
             </a:extLst>
           </p:cNvPr>
@@ -3563,7 +3657,7 @@
         </p:blipFill>
         <p:spPr>
           <a:xfrm>
-            <a:off x="249381" y="609600"/>
+            <a:off x="5454072" y="609600"/>
             <a:ext cx="6248400" cy="6248400"/>
           </a:xfrm>
           <a:prstGeom prst="rect">
@@ -3571,46 +3665,69 @@
           </a:prstGeom>
         </p:spPr>
       </p:pic>
-      <p:pic>
-        <p:nvPicPr>
-          <p:cNvPr id="9" name="Picture 8" descr="Graphical user interface, chart&#10;&#10;Description automatically generated">
-            <a:extLst>
-              <a:ext uri="{FF2B5EF4-FFF2-40B4-BE49-F238E27FC236}">
-                <a16:creationId xmlns:a16="http://schemas.microsoft.com/office/drawing/2014/main" id="{991AB92C-9B35-48DA-8737-1933C7CC3C86}"/>
-              </a:ext>
-            </a:extLst>
-          </p:cNvPr>
-          <p:cNvPicPr>
-            <a:picLocks noChangeAspect="1"/>
-          </p:cNvPicPr>
+      <p:sp>
+        <p:nvSpPr>
+          <p:cNvPr id="6" name="TextBox 5">
+            <a:extLst>
+              <a:ext uri="{FF2B5EF4-FFF2-40B4-BE49-F238E27FC236}">
+                <a16:creationId xmlns:a16="http://schemas.microsoft.com/office/drawing/2014/main" id="{119CD9B4-AB58-407C-A86E-130A6BA5BCF3}"/>
+              </a:ext>
+            </a:extLst>
+          </p:cNvPr>
+          <p:cNvSpPr txBox="1"/>
           <p:nvPr/>
-        </p:nvPicPr>
-        <p:blipFill>
-          <a:blip r:embed="rId3">
-            <a:extLst>
-              <a:ext uri="{28A0092B-C50C-407E-A947-70E740481C1C}">
-                <a14:useLocalDpi xmlns:a14="http://schemas.microsoft.com/office/drawing/2010/main" val="0"/>
-              </a:ext>
-            </a:extLst>
-          </a:blip>
-          <a:stretch>
-            <a:fillRect/>
-          </a:stretch>
-        </p:blipFill>
+        </p:nvSpPr>
         <p:spPr>
           <a:xfrm>
-            <a:off x="5454072" y="609600"/>
-            <a:ext cx="6248400" cy="6248400"/>
+            <a:off x="327171" y="2421617"/>
+            <a:ext cx="4639112" cy="1477328"/>
           </a:xfrm>
           <a:prstGeom prst="rect">
             <a:avLst/>
           </a:prstGeom>
-        </p:spPr>
-      </p:pic>
+          <a:noFill/>
+        </p:spPr>
+        <p:txBody>
+          <a:bodyPr wrap="square" rtlCol="0">
+            <a:spAutoFit/>
+          </a:bodyPr>
+          <a:lstStyle/>
+          <a:p>
+            <a:pPr marL="285750" indent="-285750">
+              <a:buFont typeface="Arial" panose="020B0604020202020204" pitchFamily="34" charset="0"/>
+              <a:buChar char="•"/>
+            </a:pPr>
+            <a:r>
+              <a:rPr lang="en-US" dirty="0"/>
+              <a:t>Power</a:t>
+            </a:r>
+          </a:p>
+          <a:p>
+            <a:pPr marL="285750" indent="-285750">
+              <a:buFont typeface="Arial" panose="020B0604020202020204" pitchFamily="34" charset="0"/>
+              <a:buChar char="•"/>
+            </a:pPr>
+            <a:r>
+              <a:rPr lang="en-US" dirty="0"/>
+              <a:t>Generated a data set of varying sparsity and inter-taxa correlation with 10,000 samples.</a:t>
+            </a:r>
+          </a:p>
+          <a:p>
+            <a:pPr marL="285750" indent="-285750">
+              <a:buFont typeface="Arial" panose="020B0604020202020204" pitchFamily="34" charset="0"/>
+              <a:buChar char="•"/>
+            </a:pPr>
+            <a:r>
+              <a:rPr lang="en-US" dirty="0"/>
+              <a:t>Have a set of 100 variables to be inflated across all samples with different effect sizes. </a:t>
+            </a:r>
+          </a:p>
+        </p:txBody>
+      </p:sp>
     </p:spTree>
     <p:extLst>
       <p:ext uri="{BB962C8B-B14F-4D97-AF65-F5344CB8AC3E}">
-        <p14:creationId xmlns:p14="http://schemas.microsoft.com/office/powerpoint/2010/main" val="3748886881"/>
+        <p14:creationId xmlns:p14="http://schemas.microsoft.com/office/powerpoint/2010/main" val="4272280830"/>
       </p:ext>
     </p:extLst>
   </p:cSld>
@@ -3723,7 +3840,7 @@
         <p:spPr>
           <a:xfrm>
             <a:off x="184558" y="2228671"/>
-            <a:ext cx="4639112" cy="1200329"/>
+            <a:ext cx="4639112" cy="2862322"/>
           </a:xfrm>
           <a:prstGeom prst="rect">
             <a:avLst/>
@@ -3742,7 +3859,17 @@
             </a:pPr>
             <a:r>
               <a:rPr lang="en-US" dirty="0"/>
-              <a:t>Quantifies the rank-ordering of samples based on enrichment scores </a:t>
+              <a:t>Generated 10 data sets per simulation condition, 300 samples per data set, 50 taxa belonging to 1 set that is DE in half the samples. </a:t>
+            </a:r>
+          </a:p>
+          <a:p>
+            <a:pPr marL="285750" indent="-285750">
+              <a:buFont typeface="Arial" panose="020B0604020202020204" pitchFamily="34" charset="0"/>
+              <a:buChar char="•"/>
+            </a:pPr>
+            <a:r>
+              <a:rPr lang="en-US" dirty="0"/>
+              <a:t>AUC values here quantifies the rank-ordering of samples based on enrichment scores in comparison to true labels (where samples have a truly DA set of taxa)  </a:t>
             </a:r>
           </a:p>
           <a:p>
@@ -3842,22 +3969,30 @@
             </a:r>
           </a:p>
           <a:p>
+            <a:r>
+              <a:rPr lang="en-US" dirty="0"/>
+              <a:t>Modify the test statistic to improve performance at the sample level</a:t>
+            </a:r>
+          </a:p>
+          <a:p>
             <a:pPr lvl="1"/>
             <a:r>
               <a:rPr lang="en-US" dirty="0"/>
-              <a:t>More complex correlation structures and complex sparsity settings</a:t>
-            </a:r>
-          </a:p>
-          <a:p>
+              <a:t>Seeing if different zero-treatments would improve performance.</a:t>
+            </a:r>
+          </a:p>
+          <a:p>
+            <a:pPr lvl="1"/>
             <a:r>
               <a:rPr lang="en-US" dirty="0"/>
-              <a:t>Seeing if different zero-treatments would improve performance. </a:t>
-            </a:r>
-          </a:p>
-          <a:p>
+              <a:t>Account for correlation </a:t>
+            </a:r>
+          </a:p>
+          <a:p>
+            <a:pPr lvl="1"/>
             <a:r>
               <a:rPr lang="en-US" dirty="0"/>
-              <a:t>Figure out the best way to get the null distribution of the test statistic to improve power and type I error at the single sample level</a:t>
+              <a:t>Figure out the best approximation of the null distribution</a:t>
             </a:r>
           </a:p>
         </p:txBody>
@@ -5369,8 +5504,8 @@
           </a:p>
         </p:txBody>
       </p:sp>
-      <mc:AlternateContent xmlns:mc="http://schemas.openxmlformats.org/markup-compatibility/2006">
-        <mc:Choice xmlns:a14="http://schemas.microsoft.com/office/drawing/2010/main" Requires="a14">
+      <mc:AlternateContent xmlns:mc="http://schemas.openxmlformats.org/markup-compatibility/2006" xmlns:a14="http://schemas.microsoft.com/office/drawing/2010/main">
+        <mc:Choice Requires="a14">
           <p:sp>
             <p:nvSpPr>
               <p:cNvPr id="3" name="Content Placeholder 2">
@@ -5458,7 +5593,7 @@
             </p:txBody>
           </p:sp>
         </mc:Choice>
-        <mc:Fallback>
+        <mc:Fallback xmlns="">
           <p:sp>
             <p:nvSpPr>
               <p:cNvPr id="3" name="Content Placeholder 2">
@@ -5502,8 +5637,8 @@
           </p:sp>
         </mc:Fallback>
       </mc:AlternateContent>
-      <mc:AlternateContent xmlns:mc="http://schemas.openxmlformats.org/markup-compatibility/2006">
-        <mc:Choice xmlns:a14="http://schemas.microsoft.com/office/drawing/2010/main" Requires="a14">
+      <mc:AlternateContent xmlns:mc="http://schemas.openxmlformats.org/markup-compatibility/2006" xmlns:a14="http://schemas.microsoft.com/office/drawing/2010/main">
+        <mc:Choice Requires="a14">
           <p:sp>
             <p:nvSpPr>
               <p:cNvPr id="4" name="TextBox 3">
@@ -5745,7 +5880,7 @@
             </p:txBody>
           </p:sp>
         </mc:Choice>
-        <mc:Fallback>
+        <mc:Fallback xmlns="">
           <p:sp>
             <p:nvSpPr>
               <p:cNvPr id="4" name="TextBox 3">
@@ -6139,6 +6274,135 @@
           </a:prstGeom>
         </p:spPr>
       </p:pic>
+      <p:sp>
+        <p:nvSpPr>
+          <p:cNvPr id="5" name="Rectangle 4">
+            <a:extLst>
+              <a:ext uri="{FF2B5EF4-FFF2-40B4-BE49-F238E27FC236}">
+                <a16:creationId xmlns:a16="http://schemas.microsoft.com/office/drawing/2014/main" id="{88EBD5F4-3BAC-4C07-B7E0-AC5CAF105C8E}"/>
+              </a:ext>
+            </a:extLst>
+          </p:cNvPr>
+          <p:cNvSpPr/>
+          <p:nvPr/>
+        </p:nvSpPr>
+        <p:spPr>
+          <a:xfrm>
+            <a:off x="940034" y="2665836"/>
+            <a:ext cx="2331672" cy="1838550"/>
+          </a:xfrm>
+          <a:prstGeom prst="rect">
+            <a:avLst/>
+          </a:prstGeom>
+          <a:noFill/>
+          <a:ln>
+            <a:solidFill>
+              <a:srgbClr val="FF0000"/>
+            </a:solidFill>
+          </a:ln>
+        </p:spPr>
+        <p:style>
+          <a:lnRef idx="2">
+            <a:schemeClr val="accent1">
+              <a:shade val="50000"/>
+            </a:schemeClr>
+          </a:lnRef>
+          <a:fillRef idx="1">
+            <a:schemeClr val="accent1"/>
+          </a:fillRef>
+          <a:effectRef idx="0">
+            <a:schemeClr val="accent1"/>
+          </a:effectRef>
+          <a:fontRef idx="minor">
+            <a:schemeClr val="lt1"/>
+          </a:fontRef>
+        </p:style>
+        <p:txBody>
+          <a:bodyPr rtlCol="0" anchor="ctr"/>
+          <a:lstStyle/>
+          <a:p>
+            <a:pPr algn="ctr"/>
+            <a:endParaRPr lang="en-US"/>
+          </a:p>
+        </p:txBody>
+      </p:sp>
+      <p:cxnSp>
+        <p:nvCxnSpPr>
+          <p:cNvPr id="18" name="Straight Arrow Connector 17">
+            <a:extLst>
+              <a:ext uri="{FF2B5EF4-FFF2-40B4-BE49-F238E27FC236}">
+                <a16:creationId xmlns:a16="http://schemas.microsoft.com/office/drawing/2014/main" id="{116F0F11-F31A-46E8-A282-52A8CBC6F8F2}"/>
+              </a:ext>
+            </a:extLst>
+          </p:cNvPr>
+          <p:cNvCxnSpPr>
+            <a:cxnSpLocks/>
+            <a:stCxn id="5" idx="2"/>
+          </p:cNvCxnSpPr>
+          <p:nvPr/>
+        </p:nvCxnSpPr>
+        <p:spPr>
+          <a:xfrm>
+            <a:off x="2105870" y="4504386"/>
+            <a:ext cx="380956" cy="234028"/>
+          </a:xfrm>
+          <a:prstGeom prst="straightConnector1">
+            <a:avLst/>
+          </a:prstGeom>
+          <a:ln>
+            <a:tailEnd type="triangle"/>
+          </a:ln>
+        </p:spPr>
+        <p:style>
+          <a:lnRef idx="1">
+            <a:schemeClr val="accent1"/>
+          </a:lnRef>
+          <a:fillRef idx="0">
+            <a:schemeClr val="accent1"/>
+          </a:fillRef>
+          <a:effectRef idx="0">
+            <a:schemeClr val="accent1"/>
+          </a:effectRef>
+          <a:fontRef idx="minor">
+            <a:schemeClr val="tx1"/>
+          </a:fontRef>
+        </p:style>
+      </p:cxnSp>
+      <p:sp>
+        <p:nvSpPr>
+          <p:cNvPr id="21" name="TextBox 20">
+            <a:extLst>
+              <a:ext uri="{FF2B5EF4-FFF2-40B4-BE49-F238E27FC236}">
+                <a16:creationId xmlns:a16="http://schemas.microsoft.com/office/drawing/2014/main" id="{A3ADF260-44AB-4DCB-8F08-2CD2B33834A8}"/>
+              </a:ext>
+            </a:extLst>
+          </p:cNvPr>
+          <p:cNvSpPr txBox="1"/>
+          <p:nvPr/>
+        </p:nvSpPr>
+        <p:spPr>
+          <a:xfrm>
+            <a:off x="2500312" y="4612546"/>
+            <a:ext cx="1637347" cy="369332"/>
+          </a:xfrm>
+          <a:prstGeom prst="rect">
+            <a:avLst/>
+          </a:prstGeom>
+          <a:noFill/>
+        </p:spPr>
+        <p:txBody>
+          <a:bodyPr wrap="square" rtlCol="0">
+            <a:spAutoFit/>
+          </a:bodyPr>
+          <a:lstStyle/>
+          <a:p>
+            <a:r>
+              <a:rPr lang="en-US" dirty="0"/>
+              <a:t>Scaling factor</a:t>
+            </a:r>
+          </a:p>
+        </p:txBody>
+      </p:sp>
     </p:spTree>
     <p:extLst>
       <p:ext uri="{BB962C8B-B14F-4D97-AF65-F5344CB8AC3E}">
@@ -6171,92 +6435,158 @@
       </p:grpSpPr>
       <p:sp>
         <p:nvSpPr>
-          <p:cNvPr id="2" name="Title 1">
-            <a:extLst>
-              <a:ext uri="{FF2B5EF4-FFF2-40B4-BE49-F238E27FC236}">
-                <a16:creationId xmlns:a16="http://schemas.microsoft.com/office/drawing/2014/main" id="{7830A764-57AC-4636-BE0A-9CEA2D1941A3}"/>
-              </a:ext>
-            </a:extLst>
-          </p:cNvPr>
-          <p:cNvSpPr>
-            <a:spLocks noGrp="1"/>
-          </p:cNvSpPr>
-          <p:nvPr>
-            <p:ph type="title"/>
-          </p:nvPr>
-        </p:nvSpPr>
-        <p:spPr/>
-        <p:txBody>
-          <a:bodyPr/>
-          <a:lstStyle/>
-          <a:p>
-            <a:r>
-              <a:rPr lang="en-US" dirty="0"/>
-              <a:t>Next steps</a:t>
-            </a:r>
-          </a:p>
-        </p:txBody>
-      </p:sp>
-      <p:sp>
-        <p:nvSpPr>
-          <p:cNvPr id="3" name="Content Placeholder 2">
-            <a:extLst>
-              <a:ext uri="{FF2B5EF4-FFF2-40B4-BE49-F238E27FC236}">
-                <a16:creationId xmlns:a16="http://schemas.microsoft.com/office/drawing/2014/main" id="{F148E6B8-0A85-48C0-A246-2F19549EF0FD}"/>
-              </a:ext>
-            </a:extLst>
-          </p:cNvPr>
-          <p:cNvSpPr>
-            <a:spLocks noGrp="1"/>
-          </p:cNvSpPr>
-          <p:nvPr>
-            <p:ph idx="1"/>
-          </p:nvPr>
+          <p:cNvPr id="4" name="TextBox 3">
+            <a:extLst>
+              <a:ext uri="{FF2B5EF4-FFF2-40B4-BE49-F238E27FC236}">
+                <a16:creationId xmlns:a16="http://schemas.microsoft.com/office/drawing/2014/main" id="{CF2E4B08-A27B-441A-9BE9-971197714EED}"/>
+              </a:ext>
+            </a:extLst>
+          </p:cNvPr>
+          <p:cNvSpPr txBox="1"/>
+          <p:nvPr/>
         </p:nvSpPr>
         <p:spPr>
           <a:xfrm>
-            <a:off x="838200" y="1825625"/>
-            <a:ext cx="10515600" cy="1766661"/>
-          </a:xfrm>
-        </p:spPr>
-        <p:txBody>
-          <a:bodyPr>
-            <a:normAutofit fontScale="92500" lnSpcReduction="10000"/>
+            <a:off x="401952" y="1478453"/>
+            <a:ext cx="4932048" cy="4324261"/>
+          </a:xfrm>
+          <a:prstGeom prst="rect">
+            <a:avLst/>
+          </a:prstGeom>
+          <a:noFill/>
+        </p:spPr>
+        <p:txBody>
+          <a:bodyPr wrap="square" rtlCol="0">
+            <a:spAutoFit/>
           </a:bodyPr>
           <a:lstStyle/>
           <a:p>
-            <a:r>
-              <a:rPr lang="en-US" dirty="0"/>
-              <a:t>Re-do the implementation that is more stable </a:t>
-            </a:r>
-          </a:p>
-          <a:p>
-            <a:r>
-              <a:rPr lang="en-US" dirty="0"/>
-              <a:t>Simulate differential abundance analysis </a:t>
-            </a:r>
-          </a:p>
-          <a:p>
-            <a:r>
-              <a:rPr lang="en-US" dirty="0"/>
-              <a:t>Investigate issues with sparsity </a:t>
-            </a:r>
-          </a:p>
-          <a:p>
-            <a:r>
-              <a:rPr lang="en-US" dirty="0"/>
-              <a:t>Define statistical properties of the statistic and write-up that section</a:t>
-            </a:r>
-          </a:p>
-          <a:p>
-            <a:endParaRPr lang="en-US" dirty="0"/>
-          </a:p>
-        </p:txBody>
-      </p:sp>
+            <a:pPr marL="285750" indent="-285750">
+              <a:buFont typeface="Arial" panose="020B0604020202020204" pitchFamily="34" charset="0"/>
+              <a:buChar char="•"/>
+            </a:pPr>
+            <a:r>
+              <a:rPr lang="en-US" sz="2500" dirty="0"/>
+              <a:t>Generating zero-inflated negative binomial data from normal-copula functions. Parameters of zero-inflated marginals drawn from fitting the distribution to each OTU in the HMP 16S data set. Effect size is calculated as a multiplier to the mean of the distribution</a:t>
+            </a:r>
+          </a:p>
+          <a:p>
+            <a:pPr marL="742950" lvl="1" indent="-285750">
+              <a:buFont typeface="Arial" panose="020B0604020202020204" pitchFamily="34" charset="0"/>
+              <a:buChar char="•"/>
+            </a:pPr>
+            <a:r>
+              <a:rPr lang="en-US" sz="2500" dirty="0"/>
+              <a:t>Flexible correlation </a:t>
+            </a:r>
+          </a:p>
+          <a:p>
+            <a:pPr marL="742950" lvl="1" indent="-285750">
+              <a:buFont typeface="Arial" panose="020B0604020202020204" pitchFamily="34" charset="0"/>
+              <a:buChar char="•"/>
+            </a:pPr>
+            <a:r>
+              <a:rPr lang="en-US" sz="2500" dirty="0"/>
+              <a:t>Flexible zero-inflation </a:t>
+            </a:r>
+          </a:p>
+        </p:txBody>
+      </p:sp>
+      <p:sp>
+        <p:nvSpPr>
+          <p:cNvPr id="7" name="Title 1">
+            <a:extLst>
+              <a:ext uri="{FF2B5EF4-FFF2-40B4-BE49-F238E27FC236}">
+                <a16:creationId xmlns:a16="http://schemas.microsoft.com/office/drawing/2014/main" id="{D4E4775B-5CEB-4126-B208-804A55720058}"/>
+              </a:ext>
+            </a:extLst>
+          </p:cNvPr>
+          <p:cNvSpPr txBox="1">
+            <a:spLocks/>
+          </p:cNvSpPr>
+          <p:nvPr/>
+        </p:nvSpPr>
+        <p:spPr>
+          <a:xfrm>
+            <a:off x="401952" y="553673"/>
+            <a:ext cx="4317830" cy="757892"/>
+          </a:xfrm>
+          <a:prstGeom prst="rect">
+            <a:avLst/>
+          </a:prstGeom>
+        </p:spPr>
+        <p:txBody>
+          <a:bodyPr vert="horz" lIns="91440" tIns="45720" rIns="91440" bIns="45720" rtlCol="0" anchor="b">
+            <a:normAutofit/>
+          </a:bodyPr>
+          <a:lstStyle>
+            <a:lvl1pPr algn="ctr" defTabSz="914400" rtl="0" eaLnBrk="1" latinLnBrk="0" hangingPunct="1">
+              <a:lnSpc>
+                <a:spcPct val="90000"/>
+              </a:lnSpc>
+              <a:spcBef>
+                <a:spcPct val="0"/>
+              </a:spcBef>
+              <a:buNone/>
+              <a:defRPr sz="6000" kern="1200">
+                <a:solidFill>
+                  <a:schemeClr val="tx1"/>
+                </a:solidFill>
+                <a:latin typeface="+mj-lt"/>
+                <a:ea typeface="+mj-ea"/>
+                <a:cs typeface="+mj-cs"/>
+              </a:defRPr>
+            </a:lvl1pPr>
+          </a:lstStyle>
+          <a:p>
+            <a:pPr algn="l"/>
+            <a:r>
+              <a:rPr lang="en-US" sz="4000" dirty="0"/>
+              <a:t>Simulation Design</a:t>
+            </a:r>
+          </a:p>
+        </p:txBody>
+      </p:sp>
+      <p:pic>
+        <p:nvPicPr>
+          <p:cNvPr id="9" name="Picture 8" descr="Chart, bar chart&#10;&#10;Description automatically generated">
+            <a:extLst>
+              <a:ext uri="{FF2B5EF4-FFF2-40B4-BE49-F238E27FC236}">
+                <a16:creationId xmlns:a16="http://schemas.microsoft.com/office/drawing/2014/main" id="{ED34E1B3-2314-433F-8C1B-C01A5A1FF86C}"/>
+              </a:ext>
+            </a:extLst>
+          </p:cNvPr>
+          <p:cNvPicPr>
+            <a:picLocks noChangeAspect="1"/>
+          </p:cNvPicPr>
+          <p:nvPr/>
+        </p:nvPicPr>
+        <p:blipFill>
+          <a:blip r:embed="rId2">
+            <a:extLst>
+              <a:ext uri="{28A0092B-C50C-407E-A947-70E740481C1C}">
+                <a14:useLocalDpi xmlns:a14="http://schemas.microsoft.com/office/drawing/2010/main" val="0"/>
+              </a:ext>
+            </a:extLst>
+          </a:blip>
+          <a:stretch>
+            <a:fillRect/>
+          </a:stretch>
+        </p:blipFill>
+        <p:spPr>
+          <a:xfrm>
+            <a:off x="5334000" y="0"/>
+            <a:ext cx="6858000" cy="6858000"/>
+          </a:xfrm>
+          <a:prstGeom prst="rect">
+            <a:avLst/>
+          </a:prstGeom>
+        </p:spPr>
+      </p:pic>
     </p:spTree>
     <p:extLst>
       <p:ext uri="{BB962C8B-B14F-4D97-AF65-F5344CB8AC3E}">
-        <p14:creationId xmlns:p14="http://schemas.microsoft.com/office/powerpoint/2010/main" val="3662524637"/>
+        <p14:creationId xmlns:p14="http://schemas.microsoft.com/office/powerpoint/2010/main" val="459208083"/>
       </p:ext>
     </p:extLst>
   </p:cSld>
@@ -6283,126 +6613,12 @@
           <a:chExt cx="0" cy="0"/>
         </a:xfrm>
       </p:grpSpPr>
-      <p:sp>
-        <p:nvSpPr>
-          <p:cNvPr id="4" name="TextBox 3">
-            <a:extLst>
-              <a:ext uri="{FF2B5EF4-FFF2-40B4-BE49-F238E27FC236}">
-                <a16:creationId xmlns:a16="http://schemas.microsoft.com/office/drawing/2014/main" id="{CF2E4B08-A27B-441A-9BE9-971197714EED}"/>
-              </a:ext>
-            </a:extLst>
-          </p:cNvPr>
-          <p:cNvSpPr txBox="1"/>
-          <p:nvPr/>
-        </p:nvSpPr>
-        <p:spPr>
-          <a:xfrm>
-            <a:off x="401952" y="1478453"/>
-            <a:ext cx="4932048" cy="4324261"/>
-          </a:xfrm>
-          <a:prstGeom prst="rect">
-            <a:avLst/>
-          </a:prstGeom>
-          <a:noFill/>
-        </p:spPr>
-        <p:txBody>
-          <a:bodyPr wrap="square" rtlCol="0">
-            <a:spAutoFit/>
-          </a:bodyPr>
-          <a:lstStyle/>
-          <a:p>
-            <a:pPr marL="285750" indent="-285750">
-              <a:buFont typeface="Arial" panose="020B0604020202020204" pitchFamily="34" charset="0"/>
-              <a:buChar char="•"/>
-            </a:pPr>
-            <a:r>
-              <a:rPr lang="en-US" sz="2500" dirty="0"/>
-              <a:t>Generating zero-inflated negative binomial data from normal-copula functions. Parameters of zero-inflated marginals drawn from fitting the distribution to each OTU in the HMP 16S data set. Effect size is calculated as a multiplier to the mean of the distribution</a:t>
-            </a:r>
-          </a:p>
-          <a:p>
-            <a:pPr marL="742950" lvl="1" indent="-285750">
-              <a:buFont typeface="Arial" panose="020B0604020202020204" pitchFamily="34" charset="0"/>
-              <a:buChar char="•"/>
-            </a:pPr>
-            <a:r>
-              <a:rPr lang="en-US" sz="2500" dirty="0"/>
-              <a:t>Flexible correlation </a:t>
-            </a:r>
-          </a:p>
-          <a:p>
-            <a:pPr marL="742950" lvl="1" indent="-285750">
-              <a:buFont typeface="Arial" panose="020B0604020202020204" pitchFamily="34" charset="0"/>
-              <a:buChar char="•"/>
-            </a:pPr>
-            <a:r>
-              <a:rPr lang="en-US" sz="2500" dirty="0"/>
-              <a:t>Flexible zero-inflation </a:t>
-            </a:r>
-          </a:p>
-        </p:txBody>
-      </p:sp>
-      <p:sp>
-        <p:nvSpPr>
-          <p:cNvPr id="7" name="Title 1">
-            <a:extLst>
-              <a:ext uri="{FF2B5EF4-FFF2-40B4-BE49-F238E27FC236}">
-                <a16:creationId xmlns:a16="http://schemas.microsoft.com/office/drawing/2014/main" id="{D4E4775B-5CEB-4126-B208-804A55720058}"/>
-              </a:ext>
-            </a:extLst>
-          </p:cNvPr>
-          <p:cNvSpPr txBox="1">
-            <a:spLocks/>
-          </p:cNvSpPr>
-          <p:nvPr/>
-        </p:nvSpPr>
-        <p:spPr>
-          <a:xfrm>
-            <a:off x="401952" y="553673"/>
-            <a:ext cx="4317830" cy="757892"/>
-          </a:xfrm>
-          <a:prstGeom prst="rect">
-            <a:avLst/>
-          </a:prstGeom>
-        </p:spPr>
-        <p:txBody>
-          <a:bodyPr vert="horz" lIns="91440" tIns="45720" rIns="91440" bIns="45720" rtlCol="0" anchor="b">
-            <a:normAutofit/>
-          </a:bodyPr>
-          <a:lstStyle>
-            <a:lvl1pPr algn="ctr" defTabSz="914400" rtl="0" eaLnBrk="1" latinLnBrk="0" hangingPunct="1">
-              <a:lnSpc>
-                <a:spcPct val="90000"/>
-              </a:lnSpc>
-              <a:spcBef>
-                <a:spcPct val="0"/>
-              </a:spcBef>
-              <a:buNone/>
-              <a:defRPr sz="6000" kern="1200">
-                <a:solidFill>
-                  <a:schemeClr val="tx1"/>
-                </a:solidFill>
-                <a:latin typeface="+mj-lt"/>
-                <a:ea typeface="+mj-ea"/>
-                <a:cs typeface="+mj-cs"/>
-              </a:defRPr>
-            </a:lvl1pPr>
-          </a:lstStyle>
-          <a:p>
-            <a:pPr algn="l"/>
-            <a:r>
-              <a:rPr lang="en-US" sz="4000" dirty="0"/>
-              <a:t>Simulation Design</a:t>
-            </a:r>
-          </a:p>
-        </p:txBody>
-      </p:sp>
       <p:pic>
         <p:nvPicPr>
-          <p:cNvPr id="9" name="Picture 8" descr="Chart, bar chart&#10;&#10;Description automatically generated">
-            <a:extLst>
-              <a:ext uri="{FF2B5EF4-FFF2-40B4-BE49-F238E27FC236}">
-                <a16:creationId xmlns:a16="http://schemas.microsoft.com/office/drawing/2014/main" id="{ED34E1B3-2314-433F-8C1B-C01A5A1FF86C}"/>
+          <p:cNvPr id="3" name="Picture 2" descr="Chart, line chart&#10;&#10;Description automatically generated">
+            <a:extLst>
+              <a:ext uri="{FF2B5EF4-FFF2-40B4-BE49-F238E27FC236}">
+                <a16:creationId xmlns:a16="http://schemas.microsoft.com/office/drawing/2014/main" id="{DB5067B4-3E5A-424B-90FC-370EE3E4B7E8}"/>
               </a:ext>
             </a:extLst>
           </p:cNvPr>
@@ -6425,8 +6641,8 @@
         </p:blipFill>
         <p:spPr>
           <a:xfrm>
-            <a:off x="5334000" y="0"/>
-            <a:ext cx="6858000" cy="6858000"/>
+            <a:off x="341734" y="228593"/>
+            <a:ext cx="10972822" cy="6400813"/>
           </a:xfrm>
           <a:prstGeom prst="rect">
             <a:avLst/>
@@ -6436,7 +6652,7 @@
     </p:spTree>
     <p:extLst>
       <p:ext uri="{BB962C8B-B14F-4D97-AF65-F5344CB8AC3E}">
-        <p14:creationId xmlns:p14="http://schemas.microsoft.com/office/powerpoint/2010/main" val="459208083"/>
+        <p14:creationId xmlns:p14="http://schemas.microsoft.com/office/powerpoint/2010/main" val="2318282007"/>
       </p:ext>
     </p:extLst>
   </p:cSld>

</xml_diff>